<commit_message>
Experimental results are verified and corrected with new measurements.
</commit_message>
<xml_diff>
--- a/Weekly Reports/2019.09.11 - 2019.09.18 Report.pptx
+++ b/Weekly Reports/2019.09.11 - 2019.09.18 Report.pptx
@@ -5,11 +5,12 @@
     <p:sldMasterId id="2147483648" r:id="rId1"/>
   </p:sldMasterIdLst>
   <p:notesMasterIdLst>
-    <p:notesMasterId r:id="rId4"/>
+    <p:notesMasterId r:id="rId5"/>
   </p:notesMasterIdLst>
   <p:sldIdLst>
     <p:sldId id="256" r:id="rId2"/>
     <p:sldId id="257" r:id="rId3"/>
+    <p:sldId id="258" r:id="rId4"/>
   </p:sldIdLst>
   <p:sldSz cx="12192000" cy="6858000"/>
   <p:notesSz cx="6858000" cy="9144000"/>
@@ -198,7 +199,7 @@
           <a:p>
             <a:fld id="{6967AB47-6931-48C6-B7ED-326D1228AFBA}" type="datetimeFigureOut">
               <a:rPr lang="tr-TR" smtClean="0"/>
-              <a:t>12.09.2019</a:t>
+              <a:t>13.09.2019</a:t>
             </a:fld>
             <a:endParaRPr lang="tr-TR"/>
           </a:p>
@@ -597,7 +598,7 @@
           <a:p>
             <a:fld id="{BD3B3769-65FE-41EA-85B6-D9F2AF76CBA9}" type="datetime1">
               <a:rPr lang="tr-TR" smtClean="0"/>
-              <a:t>12.09.2019</a:t>
+              <a:t>13.09.2019</a:t>
             </a:fld>
             <a:endParaRPr lang="tr-TR"/>
           </a:p>
@@ -767,7 +768,7 @@
           <a:p>
             <a:fld id="{2962A6A9-D976-4BDA-B10C-66B2B9DE9B4C}" type="datetime1">
               <a:rPr lang="tr-TR" smtClean="0"/>
-              <a:t>12.09.2019</a:t>
+              <a:t>13.09.2019</a:t>
             </a:fld>
             <a:endParaRPr lang="tr-TR"/>
           </a:p>
@@ -947,7 +948,7 @@
           <a:p>
             <a:fld id="{5600552A-E4D4-4B40-9929-1D3FB71F71FF}" type="datetime1">
               <a:rPr lang="tr-TR" smtClean="0"/>
-              <a:t>12.09.2019</a:t>
+              <a:t>13.09.2019</a:t>
             </a:fld>
             <a:endParaRPr lang="tr-TR"/>
           </a:p>
@@ -1117,7 +1118,7 @@
           <a:p>
             <a:fld id="{F9A85ECC-3CE4-4AD0-8EC5-3A36763AA76F}" type="datetime1">
               <a:rPr lang="tr-TR" smtClean="0"/>
-              <a:t>12.09.2019</a:t>
+              <a:t>13.09.2019</a:t>
             </a:fld>
             <a:endParaRPr lang="tr-TR"/>
           </a:p>
@@ -1363,7 +1364,7 @@
           <a:p>
             <a:fld id="{39F6AA4B-9646-44CC-B325-B50A183D6636}" type="datetime1">
               <a:rPr lang="tr-TR" smtClean="0"/>
-              <a:t>12.09.2019</a:t>
+              <a:t>13.09.2019</a:t>
             </a:fld>
             <a:endParaRPr lang="tr-TR"/>
           </a:p>
@@ -1595,7 +1596,7 @@
           <a:p>
             <a:fld id="{FD69D89B-A78C-481C-B4BE-82E51E30BA9C}" type="datetime1">
               <a:rPr lang="tr-TR" smtClean="0"/>
-              <a:t>12.09.2019</a:t>
+              <a:t>13.09.2019</a:t>
             </a:fld>
             <a:endParaRPr lang="tr-TR"/>
           </a:p>
@@ -1962,7 +1963,7 @@
           <a:p>
             <a:fld id="{473BE270-57FE-4717-982D-F02DFB5BECD5}" type="datetime1">
               <a:rPr lang="tr-TR" smtClean="0"/>
-              <a:t>12.09.2019</a:t>
+              <a:t>13.09.2019</a:t>
             </a:fld>
             <a:endParaRPr lang="tr-TR"/>
           </a:p>
@@ -2080,7 +2081,7 @@
           <a:p>
             <a:fld id="{BFAEDD45-6991-4862-9E84-DDF92EF341CB}" type="datetime1">
               <a:rPr lang="tr-TR" smtClean="0"/>
-              <a:t>12.09.2019</a:t>
+              <a:t>13.09.2019</a:t>
             </a:fld>
             <a:endParaRPr lang="tr-TR"/>
           </a:p>
@@ -2175,7 +2176,7 @@
           <a:p>
             <a:fld id="{23EE56C6-14E9-4870-96BE-3550760A1300}" type="datetime1">
               <a:rPr lang="tr-TR" smtClean="0"/>
-              <a:t>12.09.2019</a:t>
+              <a:t>13.09.2019</a:t>
             </a:fld>
             <a:endParaRPr lang="tr-TR"/>
           </a:p>
@@ -2452,7 +2453,7 @@
           <a:p>
             <a:fld id="{5EB3015D-7E17-406D-9A1A-3B2ADCD0CF79}" type="datetime1">
               <a:rPr lang="tr-TR" smtClean="0"/>
-              <a:t>12.09.2019</a:t>
+              <a:t>13.09.2019</a:t>
             </a:fld>
             <a:endParaRPr lang="tr-TR"/>
           </a:p>
@@ -2705,7 +2706,7 @@
           <a:p>
             <a:fld id="{8E1B6673-63A0-461F-BFBD-58F4D74CC1A0}" type="datetime1">
               <a:rPr lang="tr-TR" smtClean="0"/>
-              <a:t>12.09.2019</a:t>
+              <a:t>13.09.2019</a:t>
             </a:fld>
             <a:endParaRPr lang="tr-TR"/>
           </a:p>
@@ -2918,7 +2919,7 @@
           <a:p>
             <a:fld id="{9E8EF2ED-7087-4201-9521-97BB02159B09}" type="datetime1">
               <a:rPr lang="tr-TR" smtClean="0"/>
-              <a:t>12.09.2019</a:t>
+              <a:t>13.09.2019</a:t>
             </a:fld>
             <a:endParaRPr lang="tr-TR"/>
           </a:p>
@@ -3393,7 +3394,7 @@
         </p:blipFill>
         <p:spPr>
           <a:xfrm>
-            <a:off x="465992" y="1478131"/>
+            <a:off x="465992" y="748366"/>
             <a:ext cx="5355001" cy="4060000"/>
           </a:xfrm>
           <a:prstGeom prst="rect">
@@ -3417,14 +3418,73 @@
         </p:blipFill>
         <p:spPr>
           <a:xfrm>
-            <a:off x="5735077" y="1386297"/>
-            <a:ext cx="6014813" cy="4243667"/>
+            <a:off x="5735077" y="748366"/>
+            <a:ext cx="5747677" cy="4055193"/>
           </a:xfrm>
           <a:prstGeom prst="rect">
             <a:avLst/>
           </a:prstGeom>
         </p:spPr>
       </p:pic>
+      <p:sp>
+        <p:nvSpPr>
+          <p:cNvPr id="2" name="TextBox 1"/>
+          <p:cNvSpPr txBox="1"/>
+          <p:nvPr/>
+        </p:nvSpPr>
+        <p:spPr>
+          <a:xfrm>
+            <a:off x="650632" y="5156021"/>
+            <a:ext cx="3367454" cy="1200329"/>
+          </a:xfrm>
+          <a:prstGeom prst="rect">
+            <a:avLst/>
+          </a:prstGeom>
+          <a:noFill/>
+        </p:spPr>
+        <p:txBody>
+          <a:bodyPr wrap="square" rtlCol="0">
+            <a:spAutoFit/>
+          </a:bodyPr>
+          <a:lstStyle/>
+          <a:p>
+            <a:r>
+              <a:rPr lang="tr-TR" dirty="0" smtClean="0"/>
+              <a:t>Soft-switching leads to</a:t>
+            </a:r>
+          </a:p>
+          <a:p>
+            <a:pPr marL="285750" indent="-285750">
+              <a:buFont typeface="Arial" panose="020B0604020202020204" pitchFamily="34" charset="0"/>
+              <a:buChar char="•"/>
+            </a:pPr>
+            <a:r>
+              <a:rPr lang="tr-TR" dirty="0" smtClean="0"/>
+              <a:t>Less Oscillation -&gt; Low EMI</a:t>
+            </a:r>
+          </a:p>
+          <a:p>
+            <a:pPr marL="285750" indent="-285750">
+              <a:buFont typeface="Arial" panose="020B0604020202020204" pitchFamily="34" charset="0"/>
+              <a:buChar char="•"/>
+            </a:pPr>
+            <a:r>
+              <a:rPr lang="tr-TR" dirty="0" smtClean="0"/>
+              <a:t>Low Overshoot Level</a:t>
+            </a:r>
+          </a:p>
+          <a:p>
+            <a:pPr marL="285750" indent="-285750">
+              <a:buFont typeface="Arial" panose="020B0604020202020204" pitchFamily="34" charset="0"/>
+              <a:buChar char="•"/>
+            </a:pPr>
+            <a:r>
+              <a:rPr lang="tr-TR" dirty="0" smtClean="0"/>
+              <a:t>Higher Switching Losses</a:t>
+            </a:r>
+          </a:p>
+        </p:txBody>
+      </p:sp>
     </p:spTree>
     <p:extLst>
       <p:ext uri="{BB962C8B-B14F-4D97-AF65-F5344CB8AC3E}">
@@ -3531,7 +3591,7 @@
         </p:blipFill>
         <p:spPr>
           <a:xfrm>
-            <a:off x="465992" y="1735132"/>
+            <a:off x="465992" y="1022980"/>
             <a:ext cx="5355001" cy="4060000"/>
           </a:xfrm>
           <a:prstGeom prst="rect">
@@ -3555,7 +3615,7 @@
         </p:blipFill>
         <p:spPr>
           <a:xfrm>
-            <a:off x="6355130" y="1735132"/>
+            <a:off x="6355130" y="1022980"/>
             <a:ext cx="5355001" cy="4060000"/>
           </a:xfrm>
           <a:prstGeom prst="rect">
@@ -3563,10 +3623,268 @@
           </a:prstGeom>
         </p:spPr>
       </p:pic>
+      <p:sp>
+        <p:nvSpPr>
+          <p:cNvPr id="7" name="TextBox 6"/>
+          <p:cNvSpPr txBox="1"/>
+          <p:nvPr/>
+        </p:nvSpPr>
+        <p:spPr>
+          <a:xfrm>
+            <a:off x="962758" y="5199982"/>
+            <a:ext cx="4668715" cy="646331"/>
+          </a:xfrm>
+          <a:prstGeom prst="rect">
+            <a:avLst/>
+          </a:prstGeom>
+          <a:noFill/>
+        </p:spPr>
+        <p:txBody>
+          <a:bodyPr wrap="square" rtlCol="0">
+            <a:spAutoFit/>
+          </a:bodyPr>
+          <a:lstStyle/>
+          <a:p>
+            <a:pPr algn="ctr"/>
+            <a:r>
+              <a:rPr lang="tr-TR" dirty="0" smtClean="0"/>
+              <a:t>Interleaving decreases output voltage ripple significantly and it doubles the ripple frequency</a:t>
+            </a:r>
+          </a:p>
+        </p:txBody>
+      </p:sp>
+      <p:sp>
+        <p:nvSpPr>
+          <p:cNvPr id="8" name="TextBox 7"/>
+          <p:cNvSpPr txBox="1"/>
+          <p:nvPr/>
+        </p:nvSpPr>
+        <p:spPr>
+          <a:xfrm>
+            <a:off x="6685085" y="5199981"/>
+            <a:ext cx="4668715" cy="646331"/>
+          </a:xfrm>
+          <a:prstGeom prst="rect">
+            <a:avLst/>
+          </a:prstGeom>
+          <a:noFill/>
+        </p:spPr>
+        <p:txBody>
+          <a:bodyPr wrap="square" rtlCol="0">
+            <a:spAutoFit/>
+          </a:bodyPr>
+          <a:lstStyle/>
+          <a:p>
+            <a:pPr algn="ctr"/>
+            <a:r>
+              <a:rPr lang="tr-TR" dirty="0" smtClean="0"/>
+              <a:t>Output voltage ripple is higher for soft-switching due to high inductor current ripple</a:t>
+            </a:r>
+          </a:p>
+        </p:txBody>
+      </p:sp>
     </p:spTree>
     <p:extLst>
       <p:ext uri="{BB962C8B-B14F-4D97-AF65-F5344CB8AC3E}">
         <p14:creationId xmlns:p14="http://schemas.microsoft.com/office/powerpoint/2010/main" val="3912145671"/>
+      </p:ext>
+    </p:extLst>
+  </p:cSld>
+  <p:clrMapOvr>
+    <a:masterClrMapping/>
+  </p:clrMapOvr>
+  <p:timing>
+    <p:tnLst>
+      <p:par>
+        <p:cTn id="1" dur="indefinite" restart="never" nodeType="tmRoot"/>
+      </p:par>
+    </p:tnLst>
+  </p:timing>
+</p:sld>
+</file>
+
+<file path=ppt/slides/slide3.xml><?xml version="1.0" encoding="utf-8"?>
+<p:sld xmlns:a="http://schemas.openxmlformats.org/drawingml/2006/main" xmlns:r="http://schemas.openxmlformats.org/officeDocument/2006/relationships" xmlns:p="http://schemas.openxmlformats.org/presentationml/2006/main">
+  <p:cSld>
+    <p:spTree>
+      <p:nvGrpSpPr>
+        <p:cNvPr id="1" name=""/>
+        <p:cNvGrpSpPr/>
+        <p:nvPr/>
+      </p:nvGrpSpPr>
+      <p:grpSpPr>
+        <a:xfrm>
+          <a:off x="0" y="0"/>
+          <a:ext cx="0" cy="0"/>
+          <a:chOff x="0" y="0"/>
+          <a:chExt cx="0" cy="0"/>
+        </a:xfrm>
+      </p:grpSpPr>
+      <p:sp>
+        <p:nvSpPr>
+          <p:cNvPr id="4" name="Slide Number Placeholder 3"/>
+          <p:cNvSpPr>
+            <a:spLocks noGrp="1"/>
+          </p:cNvSpPr>
+          <p:nvPr>
+            <p:ph type="sldNum" sz="quarter" idx="12"/>
+          </p:nvPr>
+        </p:nvSpPr>
+        <p:spPr/>
+        <p:txBody>
+          <a:bodyPr/>
+          <a:lstStyle/>
+          <a:p>
+            <a:fld id="{178508F5-8E49-4F57-B165-331DE2AB85B8}" type="slidenum">
+              <a:rPr lang="tr-TR" sz="1800" smtClean="0"/>
+              <a:t>3</a:t>
+            </a:fld>
+            <a:endParaRPr lang="tr-TR" sz="1800" dirty="0"/>
+          </a:p>
+        </p:txBody>
+      </p:sp>
+      <p:sp>
+        <p:nvSpPr>
+          <p:cNvPr id="5" name="TextBox 4"/>
+          <p:cNvSpPr txBox="1"/>
+          <p:nvPr/>
+        </p:nvSpPr>
+        <p:spPr>
+          <a:xfrm>
+            <a:off x="465992" y="219808"/>
+            <a:ext cx="6268916" cy="523220"/>
+          </a:xfrm>
+          <a:prstGeom prst="rect">
+            <a:avLst/>
+          </a:prstGeom>
+          <a:noFill/>
+        </p:spPr>
+        <p:txBody>
+          <a:bodyPr wrap="square" rtlCol="0">
+            <a:spAutoFit/>
+          </a:bodyPr>
+          <a:lstStyle/>
+          <a:p>
+            <a:r>
+              <a:rPr lang="tr-TR" sz="2800" dirty="0" smtClean="0"/>
+              <a:t>Output Voltage Ripple for Different Cases</a:t>
+            </a:r>
+            <a:endParaRPr lang="tr-TR" sz="2800" dirty="0"/>
+          </a:p>
+        </p:txBody>
+      </p:sp>
+      <p:pic>
+        <p:nvPicPr>
+          <p:cNvPr id="3" name="Picture 2"/>
+          <p:cNvPicPr>
+            <a:picLocks noChangeAspect="1"/>
+          </p:cNvPicPr>
+          <p:nvPr/>
+        </p:nvPicPr>
+        <p:blipFill>
+          <a:blip r:embed="rId2"/>
+          <a:stretch>
+            <a:fillRect/>
+          </a:stretch>
+        </p:blipFill>
+        <p:spPr>
+          <a:xfrm>
+            <a:off x="546659" y="1121821"/>
+            <a:ext cx="5383688" cy="4011667"/>
+          </a:xfrm>
+          <a:prstGeom prst="rect">
+            <a:avLst/>
+          </a:prstGeom>
+        </p:spPr>
+      </p:pic>
+      <p:pic>
+        <p:nvPicPr>
+          <p:cNvPr id="7" name="Picture 6"/>
+          <p:cNvPicPr>
+            <a:picLocks noChangeAspect="1"/>
+          </p:cNvPicPr>
+          <p:nvPr/>
+        </p:nvPicPr>
+        <p:blipFill>
+          <a:blip r:embed="rId3"/>
+          <a:stretch>
+            <a:fillRect/>
+          </a:stretch>
+        </p:blipFill>
+        <p:spPr>
+          <a:xfrm>
+            <a:off x="6495809" y="1121820"/>
+            <a:ext cx="5291252" cy="4011668"/>
+          </a:xfrm>
+          <a:prstGeom prst="rect">
+            <a:avLst/>
+          </a:prstGeom>
+        </p:spPr>
+      </p:pic>
+      <p:sp>
+        <p:nvSpPr>
+          <p:cNvPr id="8" name="TextBox 7"/>
+          <p:cNvSpPr txBox="1"/>
+          <p:nvPr/>
+        </p:nvSpPr>
+        <p:spPr>
+          <a:xfrm>
+            <a:off x="962758" y="5199982"/>
+            <a:ext cx="4668715" cy="646331"/>
+          </a:xfrm>
+          <a:prstGeom prst="rect">
+            <a:avLst/>
+          </a:prstGeom>
+          <a:noFill/>
+        </p:spPr>
+        <p:txBody>
+          <a:bodyPr wrap="square" rtlCol="0">
+            <a:spAutoFit/>
+          </a:bodyPr>
+          <a:lstStyle/>
+          <a:p>
+            <a:pPr algn="ctr"/>
+            <a:r>
+              <a:rPr lang="tr-TR" dirty="0" smtClean="0"/>
+              <a:t>Interleaving is much more important for soft-switched  ZVRT buck converter application</a:t>
+            </a:r>
+          </a:p>
+        </p:txBody>
+      </p:sp>
+      <p:sp>
+        <p:nvSpPr>
+          <p:cNvPr id="9" name="TextBox 8"/>
+          <p:cNvSpPr txBox="1"/>
+          <p:nvPr/>
+        </p:nvSpPr>
+        <p:spPr>
+          <a:xfrm>
+            <a:off x="6685085" y="5199981"/>
+            <a:ext cx="4668715" cy="646331"/>
+          </a:xfrm>
+          <a:prstGeom prst="rect">
+            <a:avLst/>
+          </a:prstGeom>
+          <a:noFill/>
+        </p:spPr>
+        <p:txBody>
+          <a:bodyPr wrap="square" rtlCol="0">
+            <a:spAutoFit/>
+          </a:bodyPr>
+          <a:lstStyle/>
+          <a:p>
+            <a:pPr algn="ctr"/>
+            <a:r>
+              <a:rPr lang="tr-TR" dirty="0" smtClean="0"/>
+              <a:t>Inductor current ripples for hard and soft switching cases</a:t>
+            </a:r>
+          </a:p>
+        </p:txBody>
+      </p:sp>
+    </p:spTree>
+    <p:extLst>
+      <p:ext uri="{BB962C8B-B14F-4D97-AF65-F5344CB8AC3E}">
+        <p14:creationId xmlns:p14="http://schemas.microsoft.com/office/powerpoint/2010/main" val="3386595263"/>
       </p:ext>
     </p:extLst>
   </p:cSld>

</xml_diff>

<commit_message>
Capacitor selection is completed. Thermal design needs to be verified.
</commit_message>
<xml_diff>
--- a/Weekly Reports/2019.09.11 - 2019.09.18 Report.pptx
+++ b/Weekly Reports/2019.09.11 - 2019.09.18 Report.pptx
@@ -5,12 +5,18 @@
     <p:sldMasterId id="2147483648" r:id="rId1"/>
   </p:sldMasterIdLst>
   <p:notesMasterIdLst>
-    <p:notesMasterId r:id="rId5"/>
+    <p:notesMasterId r:id="rId11"/>
   </p:notesMasterIdLst>
   <p:sldIdLst>
     <p:sldId id="256" r:id="rId2"/>
     <p:sldId id="257" r:id="rId3"/>
     <p:sldId id="258" r:id="rId4"/>
+    <p:sldId id="259" r:id="rId5"/>
+    <p:sldId id="260" r:id="rId6"/>
+    <p:sldId id="261" r:id="rId7"/>
+    <p:sldId id="262" r:id="rId8"/>
+    <p:sldId id="263" r:id="rId9"/>
+    <p:sldId id="264" r:id="rId10"/>
   </p:sldIdLst>
   <p:sldSz cx="12192000" cy="6858000"/>
   <p:notesSz cx="6858000" cy="9144000"/>
@@ -199,7 +205,7 @@
           <a:p>
             <a:fld id="{6967AB47-6931-48C6-B7ED-326D1228AFBA}" type="datetimeFigureOut">
               <a:rPr lang="tr-TR" smtClean="0"/>
-              <a:t>13.09.2019</a:t>
+              <a:t>19.09.2019</a:t>
             </a:fld>
             <a:endParaRPr lang="tr-TR"/>
           </a:p>
@@ -598,7 +604,7 @@
           <a:p>
             <a:fld id="{BD3B3769-65FE-41EA-85B6-D9F2AF76CBA9}" type="datetime1">
               <a:rPr lang="tr-TR" smtClean="0"/>
-              <a:t>13.09.2019</a:t>
+              <a:t>19.09.2019</a:t>
             </a:fld>
             <a:endParaRPr lang="tr-TR"/>
           </a:p>
@@ -768,7 +774,7 @@
           <a:p>
             <a:fld id="{2962A6A9-D976-4BDA-B10C-66B2B9DE9B4C}" type="datetime1">
               <a:rPr lang="tr-TR" smtClean="0"/>
-              <a:t>13.09.2019</a:t>
+              <a:t>19.09.2019</a:t>
             </a:fld>
             <a:endParaRPr lang="tr-TR"/>
           </a:p>
@@ -948,7 +954,7 @@
           <a:p>
             <a:fld id="{5600552A-E4D4-4B40-9929-1D3FB71F71FF}" type="datetime1">
               <a:rPr lang="tr-TR" smtClean="0"/>
-              <a:t>13.09.2019</a:t>
+              <a:t>19.09.2019</a:t>
             </a:fld>
             <a:endParaRPr lang="tr-TR"/>
           </a:p>
@@ -1118,7 +1124,7 @@
           <a:p>
             <a:fld id="{F9A85ECC-3CE4-4AD0-8EC5-3A36763AA76F}" type="datetime1">
               <a:rPr lang="tr-TR" smtClean="0"/>
-              <a:t>13.09.2019</a:t>
+              <a:t>19.09.2019</a:t>
             </a:fld>
             <a:endParaRPr lang="tr-TR"/>
           </a:p>
@@ -1364,7 +1370,7 @@
           <a:p>
             <a:fld id="{39F6AA4B-9646-44CC-B325-B50A183D6636}" type="datetime1">
               <a:rPr lang="tr-TR" smtClean="0"/>
-              <a:t>13.09.2019</a:t>
+              <a:t>19.09.2019</a:t>
             </a:fld>
             <a:endParaRPr lang="tr-TR"/>
           </a:p>
@@ -1596,7 +1602,7 @@
           <a:p>
             <a:fld id="{FD69D89B-A78C-481C-B4BE-82E51E30BA9C}" type="datetime1">
               <a:rPr lang="tr-TR" smtClean="0"/>
-              <a:t>13.09.2019</a:t>
+              <a:t>19.09.2019</a:t>
             </a:fld>
             <a:endParaRPr lang="tr-TR"/>
           </a:p>
@@ -1963,7 +1969,7 @@
           <a:p>
             <a:fld id="{473BE270-57FE-4717-982D-F02DFB5BECD5}" type="datetime1">
               <a:rPr lang="tr-TR" smtClean="0"/>
-              <a:t>13.09.2019</a:t>
+              <a:t>19.09.2019</a:t>
             </a:fld>
             <a:endParaRPr lang="tr-TR"/>
           </a:p>
@@ -2081,7 +2087,7 @@
           <a:p>
             <a:fld id="{BFAEDD45-6991-4862-9E84-DDF92EF341CB}" type="datetime1">
               <a:rPr lang="tr-TR" smtClean="0"/>
-              <a:t>13.09.2019</a:t>
+              <a:t>19.09.2019</a:t>
             </a:fld>
             <a:endParaRPr lang="tr-TR"/>
           </a:p>
@@ -2176,7 +2182,7 @@
           <a:p>
             <a:fld id="{23EE56C6-14E9-4870-96BE-3550760A1300}" type="datetime1">
               <a:rPr lang="tr-TR" smtClean="0"/>
-              <a:t>13.09.2019</a:t>
+              <a:t>19.09.2019</a:t>
             </a:fld>
             <a:endParaRPr lang="tr-TR"/>
           </a:p>
@@ -2453,7 +2459,7 @@
           <a:p>
             <a:fld id="{5EB3015D-7E17-406D-9A1A-3B2ADCD0CF79}" type="datetime1">
               <a:rPr lang="tr-TR" smtClean="0"/>
-              <a:t>13.09.2019</a:t>
+              <a:t>19.09.2019</a:t>
             </a:fld>
             <a:endParaRPr lang="tr-TR"/>
           </a:p>
@@ -2706,7 +2712,7 @@
           <a:p>
             <a:fld id="{8E1B6673-63A0-461F-BFBD-58F4D74CC1A0}" type="datetime1">
               <a:rPr lang="tr-TR" smtClean="0"/>
-              <a:t>13.09.2019</a:t>
+              <a:t>19.09.2019</a:t>
             </a:fld>
             <a:endParaRPr lang="tr-TR"/>
           </a:p>
@@ -2919,7 +2925,7 @@
           <a:p>
             <a:fld id="{9E8EF2ED-7087-4201-9521-97BB02159B09}" type="datetime1">
               <a:rPr lang="tr-TR" smtClean="0"/>
-              <a:t>13.09.2019</a:t>
+              <a:t>19.09.2019</a:t>
             </a:fld>
             <a:endParaRPr lang="tr-TR"/>
           </a:p>
@@ -3885,6 +3891,4001 @@
     <p:extLst>
       <p:ext uri="{BB962C8B-B14F-4D97-AF65-F5344CB8AC3E}">
         <p14:creationId xmlns:p14="http://schemas.microsoft.com/office/powerpoint/2010/main" val="3386595263"/>
+      </p:ext>
+    </p:extLst>
+  </p:cSld>
+  <p:clrMapOvr>
+    <a:masterClrMapping/>
+  </p:clrMapOvr>
+  <p:timing>
+    <p:tnLst>
+      <p:par>
+        <p:cTn id="1" dur="indefinite" restart="never" nodeType="tmRoot"/>
+      </p:par>
+    </p:tnLst>
+  </p:timing>
+</p:sld>
+</file>
+
+<file path=ppt/slides/slide4.xml><?xml version="1.0" encoding="utf-8"?>
+<p:sld xmlns:a="http://schemas.openxmlformats.org/drawingml/2006/main" xmlns:r="http://schemas.openxmlformats.org/officeDocument/2006/relationships" xmlns:p="http://schemas.openxmlformats.org/presentationml/2006/main">
+  <p:cSld>
+    <p:spTree>
+      <p:nvGrpSpPr>
+        <p:cNvPr id="1" name=""/>
+        <p:cNvGrpSpPr/>
+        <p:nvPr/>
+      </p:nvGrpSpPr>
+      <p:grpSpPr>
+        <a:xfrm>
+          <a:off x="0" y="0"/>
+          <a:ext cx="0" cy="0"/>
+          <a:chOff x="0" y="0"/>
+          <a:chExt cx="0" cy="0"/>
+        </a:xfrm>
+      </p:grpSpPr>
+      <p:pic>
+        <p:nvPicPr>
+          <p:cNvPr id="13" name="Picture 12"/>
+          <p:cNvPicPr>
+            <a:picLocks noChangeAspect="1"/>
+          </p:cNvPicPr>
+          <p:nvPr/>
+        </p:nvPicPr>
+        <p:blipFill rotWithShape="1">
+          <a:blip r:embed="rId2"/>
+          <a:srcRect b="5865"/>
+          <a:stretch/>
+        </p:blipFill>
+        <p:spPr>
+          <a:xfrm>
+            <a:off x="483577" y="3477685"/>
+            <a:ext cx="4333875" cy="3380315"/>
+          </a:xfrm>
+          <a:prstGeom prst="rect">
+            <a:avLst/>
+          </a:prstGeom>
+        </p:spPr>
+      </p:pic>
+      <p:sp>
+        <p:nvSpPr>
+          <p:cNvPr id="4" name="Slide Number Placeholder 3"/>
+          <p:cNvSpPr>
+            <a:spLocks noGrp="1"/>
+          </p:cNvSpPr>
+          <p:nvPr>
+            <p:ph type="sldNum" sz="quarter" idx="12"/>
+          </p:nvPr>
+        </p:nvSpPr>
+        <p:spPr/>
+        <p:txBody>
+          <a:bodyPr/>
+          <a:lstStyle/>
+          <a:p>
+            <a:fld id="{178508F5-8E49-4F57-B165-331DE2AB85B8}" type="slidenum">
+              <a:rPr lang="tr-TR" sz="1800" smtClean="0"/>
+              <a:t>4</a:t>
+            </a:fld>
+            <a:endParaRPr lang="tr-TR" sz="1800" dirty="0"/>
+          </a:p>
+        </p:txBody>
+      </p:sp>
+      <p:sp>
+        <p:nvSpPr>
+          <p:cNvPr id="5" name="TextBox 4"/>
+          <p:cNvSpPr txBox="1"/>
+          <p:nvPr/>
+        </p:nvSpPr>
+        <p:spPr>
+          <a:xfrm>
+            <a:off x="465992" y="219808"/>
+            <a:ext cx="6268916" cy="523220"/>
+          </a:xfrm>
+          <a:prstGeom prst="rect">
+            <a:avLst/>
+          </a:prstGeom>
+          <a:noFill/>
+        </p:spPr>
+        <p:txBody>
+          <a:bodyPr wrap="square" rtlCol="0">
+            <a:spAutoFit/>
+          </a:bodyPr>
+          <a:lstStyle/>
+          <a:p>
+            <a:r>
+              <a:rPr lang="tr-TR" sz="2800" dirty="0" smtClean="0"/>
+              <a:t>Verification of Magnetic Design</a:t>
+            </a:r>
+            <a:endParaRPr lang="tr-TR" sz="2800" dirty="0"/>
+          </a:p>
+        </p:txBody>
+      </p:sp>
+      <p:sp>
+        <p:nvSpPr>
+          <p:cNvPr id="2" name="TextBox 1"/>
+          <p:cNvSpPr txBox="1"/>
+          <p:nvPr/>
+        </p:nvSpPr>
+        <p:spPr>
+          <a:xfrm>
+            <a:off x="483577" y="931985"/>
+            <a:ext cx="6330461" cy="369332"/>
+          </a:xfrm>
+          <a:prstGeom prst="rect">
+            <a:avLst/>
+          </a:prstGeom>
+          <a:noFill/>
+        </p:spPr>
+        <p:txBody>
+          <a:bodyPr wrap="square" rtlCol="0">
+            <a:spAutoFit/>
+          </a:bodyPr>
+          <a:lstStyle/>
+          <a:p>
+            <a:r>
+              <a:rPr lang="tr-TR" dirty="0" smtClean="0"/>
+              <a:t>What are the challenges?</a:t>
+            </a:r>
+            <a:endParaRPr lang="tr-TR" dirty="0"/>
+          </a:p>
+        </p:txBody>
+      </p:sp>
+      <p:sp>
+        <p:nvSpPr>
+          <p:cNvPr id="6" name="TextBox 5"/>
+          <p:cNvSpPr txBox="1"/>
+          <p:nvPr/>
+        </p:nvSpPr>
+        <p:spPr>
+          <a:xfrm>
+            <a:off x="553915" y="1490274"/>
+            <a:ext cx="9416562" cy="2862322"/>
+          </a:xfrm>
+          <a:prstGeom prst="rect">
+            <a:avLst/>
+          </a:prstGeom>
+          <a:noFill/>
+        </p:spPr>
+        <p:txBody>
+          <a:bodyPr wrap="square" rtlCol="0">
+            <a:spAutoFit/>
+          </a:bodyPr>
+          <a:lstStyle/>
+          <a:p>
+            <a:pPr marL="285750" indent="-285750">
+              <a:buFont typeface="Arial" panose="020B0604020202020204" pitchFamily="34" charset="0"/>
+              <a:buChar char="•"/>
+            </a:pPr>
+            <a:r>
+              <a:rPr lang="tr-TR" dirty="0" smtClean="0"/>
+              <a:t>Even though DC resistance of inductor is low, </a:t>
+            </a:r>
+            <a:r>
+              <a:rPr lang="tr-TR" b="1" dirty="0" smtClean="0"/>
+              <a:t>AC resistance is an important concern </a:t>
+            </a:r>
+            <a:r>
+              <a:rPr lang="tr-TR" dirty="0" smtClean="0"/>
+              <a:t>for such high frequency &amp; high ripple current flow.</a:t>
+            </a:r>
+          </a:p>
+          <a:p>
+            <a:pPr marL="285750" indent="-285750">
+              <a:buFont typeface="Arial" panose="020B0604020202020204" pitchFamily="34" charset="0"/>
+              <a:buChar char="•"/>
+            </a:pPr>
+            <a:r>
+              <a:rPr lang="tr-TR" b="1" dirty="0" smtClean="0"/>
+              <a:t>Skin depth &amp; proximity effect </a:t>
+            </a:r>
+            <a:r>
+              <a:rPr lang="tr-TR" dirty="0" smtClean="0"/>
+              <a:t>should be analyzed.</a:t>
+            </a:r>
+          </a:p>
+          <a:p>
+            <a:pPr marL="285750" indent="-285750">
+              <a:buFont typeface="Arial" panose="020B0604020202020204" pitchFamily="34" charset="0"/>
+              <a:buChar char="•"/>
+            </a:pPr>
+            <a:r>
+              <a:rPr lang="tr-TR" dirty="0" smtClean="0"/>
+              <a:t>The </a:t>
+            </a:r>
+            <a:r>
+              <a:rPr lang="tr-TR" b="1" dirty="0" smtClean="0"/>
+              <a:t>round-wire</a:t>
+            </a:r>
+            <a:r>
+              <a:rPr lang="tr-TR" dirty="0" smtClean="0"/>
+              <a:t> inductors </a:t>
+            </a:r>
+            <a:r>
+              <a:rPr lang="tr-TR" b="1" dirty="0" smtClean="0"/>
+              <a:t>are not suitable </a:t>
+            </a:r>
+            <a:r>
+              <a:rPr lang="tr-TR" dirty="0" smtClean="0"/>
+              <a:t>due to their thickness.</a:t>
+            </a:r>
+          </a:p>
+          <a:p>
+            <a:pPr marL="285750" indent="-285750">
+              <a:buFont typeface="Arial" panose="020B0604020202020204" pitchFamily="34" charset="0"/>
+              <a:buChar char="•"/>
+            </a:pPr>
+            <a:r>
+              <a:rPr lang="tr-TR" b="1" dirty="0" smtClean="0"/>
+              <a:t>Litz wire </a:t>
+            </a:r>
+            <a:r>
+              <a:rPr lang="tr-TR" dirty="0" smtClean="0"/>
+              <a:t>inductors </a:t>
+            </a:r>
+            <a:r>
+              <a:rPr lang="tr-TR" b="1" dirty="0" smtClean="0"/>
+              <a:t>are the best </a:t>
+            </a:r>
+            <a:r>
+              <a:rPr lang="tr-TR" dirty="0" smtClean="0"/>
+              <a:t>options but somehow their </a:t>
+            </a:r>
+            <a:r>
+              <a:rPr lang="tr-TR" b="1" dirty="0" smtClean="0"/>
+              <a:t>saturation</a:t>
+            </a:r>
+          </a:p>
+          <a:p>
+            <a:r>
+              <a:rPr lang="tr-TR" b="1" dirty="0"/>
+              <a:t> </a:t>
+            </a:r>
+            <a:r>
+              <a:rPr lang="tr-TR" b="1" dirty="0" smtClean="0"/>
+              <a:t>    current limit is low</a:t>
+            </a:r>
+            <a:r>
+              <a:rPr lang="tr-TR" dirty="0" smtClean="0"/>
+              <a:t>.</a:t>
+            </a:r>
+          </a:p>
+          <a:p>
+            <a:pPr marL="285750" indent="-285750">
+              <a:buFont typeface="Arial" panose="020B0604020202020204" pitchFamily="34" charset="0"/>
+              <a:buChar char="•"/>
+            </a:pPr>
+            <a:r>
+              <a:rPr lang="tr-TR" dirty="0" smtClean="0"/>
+              <a:t>Therefore, </a:t>
+            </a:r>
+            <a:r>
+              <a:rPr lang="tr-TR" b="1" dirty="0" smtClean="0"/>
+              <a:t>flat-wire inductors are suitable </a:t>
+            </a:r>
+            <a:r>
+              <a:rPr lang="tr-TR" dirty="0" smtClean="0"/>
+              <a:t>for</a:t>
+            </a:r>
+          </a:p>
+          <a:p>
+            <a:r>
+              <a:rPr lang="tr-TR" dirty="0" smtClean="0"/>
+              <a:t>     our application.</a:t>
+            </a:r>
+          </a:p>
+          <a:p>
+            <a:endParaRPr lang="tr-TR" dirty="0" smtClean="0"/>
+          </a:p>
+          <a:p>
+            <a:endParaRPr lang="tr-TR" dirty="0"/>
+          </a:p>
+        </p:txBody>
+      </p:sp>
+      <p:pic>
+        <p:nvPicPr>
+          <p:cNvPr id="10" name="Picture 9"/>
+          <p:cNvPicPr>
+            <a:picLocks noChangeAspect="1"/>
+          </p:cNvPicPr>
+          <p:nvPr/>
+        </p:nvPicPr>
+        <p:blipFill>
+          <a:blip r:embed="rId3"/>
+          <a:stretch>
+            <a:fillRect/>
+          </a:stretch>
+        </p:blipFill>
+        <p:spPr>
+          <a:xfrm>
+            <a:off x="7659199" y="1902070"/>
+            <a:ext cx="3133725" cy="3124200"/>
+          </a:xfrm>
+          <a:prstGeom prst="rect">
+            <a:avLst/>
+          </a:prstGeom>
+        </p:spPr>
+      </p:pic>
+      <p:pic>
+        <p:nvPicPr>
+          <p:cNvPr id="11" name="Picture 10"/>
+          <p:cNvPicPr>
+            <a:picLocks noChangeAspect="1"/>
+          </p:cNvPicPr>
+          <p:nvPr/>
+        </p:nvPicPr>
+        <p:blipFill>
+          <a:blip r:embed="rId4"/>
+          <a:stretch>
+            <a:fillRect/>
+          </a:stretch>
+        </p:blipFill>
+        <p:spPr>
+          <a:xfrm>
+            <a:off x="5059973" y="3477685"/>
+            <a:ext cx="2108323" cy="2108323"/>
+          </a:xfrm>
+          <a:prstGeom prst="rect">
+            <a:avLst/>
+          </a:prstGeom>
+        </p:spPr>
+      </p:pic>
+    </p:spTree>
+    <p:extLst>
+      <p:ext uri="{BB962C8B-B14F-4D97-AF65-F5344CB8AC3E}">
+        <p14:creationId xmlns:p14="http://schemas.microsoft.com/office/powerpoint/2010/main" val="2673209781"/>
+      </p:ext>
+    </p:extLst>
+  </p:cSld>
+  <p:clrMapOvr>
+    <a:masterClrMapping/>
+  </p:clrMapOvr>
+  <p:timing>
+    <p:tnLst>
+      <p:par>
+        <p:cTn id="1" dur="indefinite" restart="never" nodeType="tmRoot"/>
+      </p:par>
+    </p:tnLst>
+  </p:timing>
+</p:sld>
+</file>
+
+<file path=ppt/slides/slide5.xml><?xml version="1.0" encoding="utf-8"?>
+<p:sld xmlns:a="http://schemas.openxmlformats.org/drawingml/2006/main" xmlns:r="http://schemas.openxmlformats.org/officeDocument/2006/relationships" xmlns:p="http://schemas.openxmlformats.org/presentationml/2006/main">
+  <p:cSld>
+    <p:spTree>
+      <p:nvGrpSpPr>
+        <p:cNvPr id="1" name=""/>
+        <p:cNvGrpSpPr/>
+        <p:nvPr/>
+      </p:nvGrpSpPr>
+      <p:grpSpPr>
+        <a:xfrm>
+          <a:off x="0" y="0"/>
+          <a:ext cx="0" cy="0"/>
+          <a:chOff x="0" y="0"/>
+          <a:chExt cx="0" cy="0"/>
+        </a:xfrm>
+      </p:grpSpPr>
+      <p:pic>
+        <p:nvPicPr>
+          <p:cNvPr id="30" name="Picture 29"/>
+          <p:cNvPicPr>
+            <a:picLocks noChangeAspect="1"/>
+          </p:cNvPicPr>
+          <p:nvPr/>
+        </p:nvPicPr>
+        <p:blipFill>
+          <a:blip r:embed="rId2"/>
+          <a:stretch>
+            <a:fillRect/>
+          </a:stretch>
+        </p:blipFill>
+        <p:spPr>
+          <a:xfrm>
+            <a:off x="3295997" y="3808638"/>
+            <a:ext cx="4172155" cy="2775350"/>
+          </a:xfrm>
+          <a:prstGeom prst="rect">
+            <a:avLst/>
+          </a:prstGeom>
+        </p:spPr>
+      </p:pic>
+      <p:cxnSp>
+        <p:nvCxnSpPr>
+          <p:cNvPr id="26" name="Elbow Connector 25"/>
+          <p:cNvCxnSpPr/>
+          <p:nvPr/>
+        </p:nvCxnSpPr>
+        <p:spPr>
+          <a:xfrm flipV="1">
+            <a:off x="5144655" y="2453982"/>
+            <a:ext cx="2358335" cy="4857"/>
+          </a:xfrm>
+          <a:prstGeom prst="bentConnector3">
+            <a:avLst>
+              <a:gd name="adj1" fmla="val 50000"/>
+            </a:avLst>
+          </a:prstGeom>
+          <a:ln w="25400">
+            <a:solidFill>
+              <a:srgbClr val="00B050"/>
+            </a:solidFill>
+            <a:tailEnd type="triangle"/>
+          </a:ln>
+        </p:spPr>
+        <p:style>
+          <a:lnRef idx="1">
+            <a:schemeClr val="accent1"/>
+          </a:lnRef>
+          <a:fillRef idx="0">
+            <a:schemeClr val="accent1"/>
+          </a:fillRef>
+          <a:effectRef idx="0">
+            <a:schemeClr val="accent1"/>
+          </a:effectRef>
+          <a:fontRef idx="minor">
+            <a:schemeClr val="tx1"/>
+          </a:fontRef>
+        </p:style>
+      </p:cxnSp>
+      <p:cxnSp>
+        <p:nvCxnSpPr>
+          <p:cNvPr id="17" name="Elbow Connector 16"/>
+          <p:cNvCxnSpPr/>
+          <p:nvPr/>
+        </p:nvCxnSpPr>
+        <p:spPr>
+          <a:xfrm flipV="1">
+            <a:off x="5144657" y="2706255"/>
+            <a:ext cx="2358335" cy="4857"/>
+          </a:xfrm>
+          <a:prstGeom prst="bentConnector3">
+            <a:avLst>
+              <a:gd name="adj1" fmla="val 50000"/>
+            </a:avLst>
+          </a:prstGeom>
+          <a:ln w="25400">
+            <a:solidFill>
+              <a:srgbClr val="00B050"/>
+            </a:solidFill>
+            <a:tailEnd type="triangle"/>
+          </a:ln>
+        </p:spPr>
+        <p:style>
+          <a:lnRef idx="1">
+            <a:schemeClr val="accent1"/>
+          </a:lnRef>
+          <a:fillRef idx="0">
+            <a:schemeClr val="accent1"/>
+          </a:fillRef>
+          <a:effectRef idx="0">
+            <a:schemeClr val="accent1"/>
+          </a:effectRef>
+          <a:fontRef idx="minor">
+            <a:schemeClr val="tx1"/>
+          </a:fontRef>
+        </p:style>
+      </p:cxnSp>
+      <p:cxnSp>
+        <p:nvCxnSpPr>
+          <p:cNvPr id="24" name="Elbow Connector 23"/>
+          <p:cNvCxnSpPr/>
+          <p:nvPr/>
+        </p:nvCxnSpPr>
+        <p:spPr>
+          <a:xfrm flipV="1">
+            <a:off x="5144657" y="2990161"/>
+            <a:ext cx="2358335" cy="4857"/>
+          </a:xfrm>
+          <a:prstGeom prst="bentConnector3">
+            <a:avLst>
+              <a:gd name="adj1" fmla="val 50000"/>
+            </a:avLst>
+          </a:prstGeom>
+          <a:ln w="25400">
+            <a:solidFill>
+              <a:srgbClr val="00B050"/>
+            </a:solidFill>
+            <a:tailEnd type="triangle"/>
+          </a:ln>
+        </p:spPr>
+        <p:style>
+          <a:lnRef idx="1">
+            <a:schemeClr val="accent1"/>
+          </a:lnRef>
+          <a:fillRef idx="0">
+            <a:schemeClr val="accent1"/>
+          </a:fillRef>
+          <a:effectRef idx="0">
+            <a:schemeClr val="accent1"/>
+          </a:effectRef>
+          <a:fontRef idx="minor">
+            <a:schemeClr val="tx1"/>
+          </a:fontRef>
+        </p:style>
+      </p:cxnSp>
+      <p:pic>
+        <p:nvPicPr>
+          <p:cNvPr id="3" name="Picture 2"/>
+          <p:cNvPicPr>
+            <a:picLocks noChangeAspect="1"/>
+          </p:cNvPicPr>
+          <p:nvPr/>
+        </p:nvPicPr>
+        <p:blipFill>
+          <a:blip r:embed="rId3"/>
+          <a:stretch>
+            <a:fillRect/>
+          </a:stretch>
+        </p:blipFill>
+        <p:spPr>
+          <a:xfrm>
+            <a:off x="553915" y="1429810"/>
+            <a:ext cx="5838825" cy="2047875"/>
+          </a:xfrm>
+          <a:prstGeom prst="rect">
+            <a:avLst/>
+          </a:prstGeom>
+        </p:spPr>
+      </p:pic>
+      <p:pic>
+        <p:nvPicPr>
+          <p:cNvPr id="13" name="Picture 12"/>
+          <p:cNvPicPr>
+            <a:picLocks noChangeAspect="1"/>
+          </p:cNvPicPr>
+          <p:nvPr/>
+        </p:nvPicPr>
+        <p:blipFill rotWithShape="1">
+          <a:blip r:embed="rId4"/>
+          <a:srcRect b="5865"/>
+          <a:stretch/>
+        </p:blipFill>
+        <p:spPr>
+          <a:xfrm>
+            <a:off x="7558629" y="3477685"/>
+            <a:ext cx="4333875" cy="3380315"/>
+          </a:xfrm>
+          <a:prstGeom prst="rect">
+            <a:avLst/>
+          </a:prstGeom>
+        </p:spPr>
+      </p:pic>
+      <p:sp>
+        <p:nvSpPr>
+          <p:cNvPr id="4" name="Slide Number Placeholder 3"/>
+          <p:cNvSpPr>
+            <a:spLocks noGrp="1"/>
+          </p:cNvSpPr>
+          <p:nvPr>
+            <p:ph type="sldNum" sz="quarter" idx="12"/>
+          </p:nvPr>
+        </p:nvSpPr>
+        <p:spPr/>
+        <p:txBody>
+          <a:bodyPr/>
+          <a:lstStyle/>
+          <a:p>
+            <a:fld id="{178508F5-8E49-4F57-B165-331DE2AB85B8}" type="slidenum">
+              <a:rPr lang="tr-TR" sz="1800" smtClean="0"/>
+              <a:t>5</a:t>
+            </a:fld>
+            <a:endParaRPr lang="tr-TR" sz="1800" dirty="0"/>
+          </a:p>
+        </p:txBody>
+      </p:sp>
+      <p:sp>
+        <p:nvSpPr>
+          <p:cNvPr id="5" name="TextBox 4"/>
+          <p:cNvSpPr txBox="1"/>
+          <p:nvPr/>
+        </p:nvSpPr>
+        <p:spPr>
+          <a:xfrm>
+            <a:off x="465992" y="219808"/>
+            <a:ext cx="6268916" cy="523220"/>
+          </a:xfrm>
+          <a:prstGeom prst="rect">
+            <a:avLst/>
+          </a:prstGeom>
+          <a:noFill/>
+        </p:spPr>
+        <p:txBody>
+          <a:bodyPr wrap="square" rtlCol="0">
+            <a:spAutoFit/>
+          </a:bodyPr>
+          <a:lstStyle/>
+          <a:p>
+            <a:r>
+              <a:rPr lang="tr-TR" sz="2800" dirty="0" smtClean="0"/>
+              <a:t>Verification of Magnetic Design</a:t>
+            </a:r>
+            <a:endParaRPr lang="tr-TR" sz="2800" dirty="0"/>
+          </a:p>
+        </p:txBody>
+      </p:sp>
+      <p:sp>
+        <p:nvSpPr>
+          <p:cNvPr id="2" name="TextBox 1"/>
+          <p:cNvSpPr txBox="1"/>
+          <p:nvPr/>
+        </p:nvSpPr>
+        <p:spPr>
+          <a:xfrm>
+            <a:off x="483577" y="931985"/>
+            <a:ext cx="6330461" cy="369332"/>
+          </a:xfrm>
+          <a:prstGeom prst="rect">
+            <a:avLst/>
+          </a:prstGeom>
+          <a:noFill/>
+        </p:spPr>
+        <p:txBody>
+          <a:bodyPr wrap="square" rtlCol="0">
+            <a:spAutoFit/>
+          </a:bodyPr>
+          <a:lstStyle/>
+          <a:p>
+            <a:r>
+              <a:rPr lang="tr-TR" dirty="0" smtClean="0"/>
+              <a:t>Selected </a:t>
+            </a:r>
+            <a:r>
+              <a:rPr lang="tr-TR" dirty="0"/>
+              <a:t>Inductor Parameters (</a:t>
+            </a:r>
+            <a:r>
+              <a:rPr lang="tr-TR" dirty="0" smtClean="0">
+                <a:hlinkClick r:id="rId5"/>
+              </a:rPr>
+              <a:t>7443640680B</a:t>
+            </a:r>
+            <a:r>
+              <a:rPr lang="tr-TR" dirty="0" smtClean="0"/>
+              <a:t>) </a:t>
+            </a:r>
+            <a:endParaRPr lang="tr-TR" dirty="0"/>
+          </a:p>
+        </p:txBody>
+      </p:sp>
+      <p:sp>
+        <p:nvSpPr>
+          <p:cNvPr id="7" name="Oval 6"/>
+          <p:cNvSpPr/>
+          <p:nvPr/>
+        </p:nvSpPr>
+        <p:spPr>
+          <a:xfrm>
+            <a:off x="4633546" y="2059709"/>
+            <a:ext cx="511109" cy="265854"/>
+          </a:xfrm>
+          <a:prstGeom prst="ellipse">
+            <a:avLst/>
+          </a:prstGeom>
+          <a:noFill/>
+          <a:ln w="38100">
+            <a:solidFill>
+              <a:srgbClr val="00B050"/>
+            </a:solidFill>
+          </a:ln>
+        </p:spPr>
+        <p:style>
+          <a:lnRef idx="2">
+            <a:schemeClr val="accent1">
+              <a:shade val="50000"/>
+            </a:schemeClr>
+          </a:lnRef>
+          <a:fillRef idx="1">
+            <a:schemeClr val="accent1"/>
+          </a:fillRef>
+          <a:effectRef idx="0">
+            <a:schemeClr val="accent1"/>
+          </a:effectRef>
+          <a:fontRef idx="minor">
+            <a:schemeClr val="lt1"/>
+          </a:fontRef>
+        </p:style>
+        <p:txBody>
+          <a:bodyPr rtlCol="0" anchor="ctr"/>
+          <a:lstStyle/>
+          <a:p>
+            <a:pPr algn="ctr"/>
+            <a:endParaRPr lang="tr-TR"/>
+          </a:p>
+        </p:txBody>
+      </p:sp>
+      <p:sp>
+        <p:nvSpPr>
+          <p:cNvPr id="15" name="TextBox 14"/>
+          <p:cNvSpPr txBox="1"/>
+          <p:nvPr/>
+        </p:nvSpPr>
+        <p:spPr>
+          <a:xfrm>
+            <a:off x="7502992" y="1201881"/>
+            <a:ext cx="3977807" cy="923330"/>
+          </a:xfrm>
+          <a:prstGeom prst="rect">
+            <a:avLst/>
+          </a:prstGeom>
+          <a:noFill/>
+        </p:spPr>
+        <p:txBody>
+          <a:bodyPr wrap="square" rtlCol="0">
+            <a:spAutoFit/>
+          </a:bodyPr>
+          <a:lstStyle/>
+          <a:p>
+            <a:r>
+              <a:rPr lang="tr-TR" dirty="0" smtClean="0"/>
+              <a:t>382 kHz switching </a:t>
+            </a:r>
+            <a:r>
+              <a:rPr lang="tr-TR" dirty="0"/>
+              <a:t>f</a:t>
+            </a:r>
+            <a:r>
+              <a:rPr lang="tr-TR" dirty="0" smtClean="0"/>
+              <a:t>requency, so lets round it to 500 kHz to decrease the ripple</a:t>
+            </a:r>
+            <a:endParaRPr lang="tr-TR" dirty="0"/>
+          </a:p>
+        </p:txBody>
+      </p:sp>
+      <p:sp>
+        <p:nvSpPr>
+          <p:cNvPr id="16" name="Oval 15"/>
+          <p:cNvSpPr/>
+          <p:nvPr/>
+        </p:nvSpPr>
+        <p:spPr>
+          <a:xfrm>
+            <a:off x="4633546" y="2586583"/>
+            <a:ext cx="511109" cy="265854"/>
+          </a:xfrm>
+          <a:prstGeom prst="ellipse">
+            <a:avLst/>
+          </a:prstGeom>
+          <a:noFill/>
+          <a:ln w="38100">
+            <a:solidFill>
+              <a:srgbClr val="00B050"/>
+            </a:solidFill>
+          </a:ln>
+        </p:spPr>
+        <p:style>
+          <a:lnRef idx="2">
+            <a:schemeClr val="accent1">
+              <a:shade val="50000"/>
+            </a:schemeClr>
+          </a:lnRef>
+          <a:fillRef idx="1">
+            <a:schemeClr val="accent1"/>
+          </a:fillRef>
+          <a:effectRef idx="0">
+            <a:schemeClr val="accent1"/>
+          </a:effectRef>
+          <a:fontRef idx="minor">
+            <a:schemeClr val="lt1"/>
+          </a:fontRef>
+        </p:style>
+        <p:txBody>
+          <a:bodyPr rtlCol="0" anchor="ctr"/>
+          <a:lstStyle/>
+          <a:p>
+            <a:pPr algn="ctr"/>
+            <a:endParaRPr lang="tr-TR"/>
+          </a:p>
+        </p:txBody>
+      </p:sp>
+      <p:sp>
+        <p:nvSpPr>
+          <p:cNvPr id="21" name="TextBox 20"/>
+          <p:cNvSpPr txBox="1"/>
+          <p:nvPr/>
+        </p:nvSpPr>
+        <p:spPr>
+          <a:xfrm>
+            <a:off x="7508387" y="2540401"/>
+            <a:ext cx="2204426" cy="369332"/>
+          </a:xfrm>
+          <a:prstGeom prst="rect">
+            <a:avLst/>
+          </a:prstGeom>
+          <a:noFill/>
+        </p:spPr>
+        <p:txBody>
+          <a:bodyPr wrap="square" rtlCol="0">
+            <a:spAutoFit/>
+          </a:bodyPr>
+          <a:lstStyle/>
+          <a:p>
+            <a:r>
+              <a:rPr lang="tr-TR" dirty="0" smtClean="0"/>
+              <a:t>No saturation risk </a:t>
+            </a:r>
+            <a:endParaRPr lang="tr-TR" dirty="0"/>
+          </a:p>
+        </p:txBody>
+      </p:sp>
+      <p:sp>
+        <p:nvSpPr>
+          <p:cNvPr id="23" name="Oval 22"/>
+          <p:cNvSpPr/>
+          <p:nvPr/>
+        </p:nvSpPr>
+        <p:spPr>
+          <a:xfrm>
+            <a:off x="4633546" y="2870489"/>
+            <a:ext cx="511109" cy="265854"/>
+          </a:xfrm>
+          <a:prstGeom prst="ellipse">
+            <a:avLst/>
+          </a:prstGeom>
+          <a:noFill/>
+          <a:ln w="38100">
+            <a:solidFill>
+              <a:srgbClr val="00B050"/>
+            </a:solidFill>
+          </a:ln>
+        </p:spPr>
+        <p:style>
+          <a:lnRef idx="2">
+            <a:schemeClr val="accent1">
+              <a:shade val="50000"/>
+            </a:schemeClr>
+          </a:lnRef>
+          <a:fillRef idx="1">
+            <a:schemeClr val="accent1"/>
+          </a:fillRef>
+          <a:effectRef idx="0">
+            <a:schemeClr val="accent1"/>
+          </a:effectRef>
+          <a:fontRef idx="minor">
+            <a:schemeClr val="lt1"/>
+          </a:fontRef>
+        </p:style>
+        <p:txBody>
+          <a:bodyPr rtlCol="0" anchor="ctr"/>
+          <a:lstStyle/>
+          <a:p>
+            <a:pPr algn="ctr"/>
+            <a:endParaRPr lang="tr-TR"/>
+          </a:p>
+        </p:txBody>
+      </p:sp>
+      <p:sp>
+        <p:nvSpPr>
+          <p:cNvPr id="25" name="TextBox 24"/>
+          <p:cNvSpPr txBox="1"/>
+          <p:nvPr/>
+        </p:nvSpPr>
+        <p:spPr>
+          <a:xfrm>
+            <a:off x="7502991" y="2804756"/>
+            <a:ext cx="2467485" cy="369332"/>
+          </a:xfrm>
+          <a:prstGeom prst="rect">
+            <a:avLst/>
+          </a:prstGeom>
+          <a:noFill/>
+        </p:spPr>
+        <p:txBody>
+          <a:bodyPr wrap="square" rtlCol="0">
+            <a:spAutoFit/>
+          </a:bodyPr>
+          <a:lstStyle/>
+          <a:p>
+            <a:r>
+              <a:rPr lang="tr-TR" dirty="0" smtClean="0"/>
+              <a:t>Very low DC resistance</a:t>
+            </a:r>
+            <a:endParaRPr lang="tr-TR" dirty="0"/>
+          </a:p>
+        </p:txBody>
+      </p:sp>
+      <p:cxnSp>
+        <p:nvCxnSpPr>
+          <p:cNvPr id="9" name="Elbow Connector 8"/>
+          <p:cNvCxnSpPr>
+            <a:stCxn id="7" idx="0"/>
+          </p:cNvCxnSpPr>
+          <p:nvPr/>
+        </p:nvCxnSpPr>
+        <p:spPr>
+          <a:xfrm rot="5400000" flipH="1" flipV="1">
+            <a:off x="5932609" y="489327"/>
+            <a:ext cx="526875" cy="2613890"/>
+          </a:xfrm>
+          <a:prstGeom prst="bentConnector2">
+            <a:avLst/>
+          </a:prstGeom>
+          <a:ln w="25400">
+            <a:solidFill>
+              <a:srgbClr val="00B050"/>
+            </a:solidFill>
+            <a:tailEnd type="triangle"/>
+          </a:ln>
+        </p:spPr>
+        <p:style>
+          <a:lnRef idx="1">
+            <a:schemeClr val="accent1"/>
+          </a:lnRef>
+          <a:fillRef idx="0">
+            <a:schemeClr val="accent1"/>
+          </a:fillRef>
+          <a:effectRef idx="0">
+            <a:schemeClr val="accent1"/>
+          </a:effectRef>
+          <a:fontRef idx="minor">
+            <a:schemeClr val="tx1"/>
+          </a:fontRef>
+        </p:style>
+      </p:cxnSp>
+      <p:sp>
+        <p:nvSpPr>
+          <p:cNvPr id="27" name="Oval 26"/>
+          <p:cNvSpPr/>
+          <p:nvPr/>
+        </p:nvSpPr>
+        <p:spPr>
+          <a:xfrm>
+            <a:off x="4633544" y="2334310"/>
+            <a:ext cx="511109" cy="265854"/>
+          </a:xfrm>
+          <a:prstGeom prst="ellipse">
+            <a:avLst/>
+          </a:prstGeom>
+          <a:noFill/>
+          <a:ln w="38100">
+            <a:solidFill>
+              <a:srgbClr val="00B050"/>
+            </a:solidFill>
+          </a:ln>
+        </p:spPr>
+        <p:style>
+          <a:lnRef idx="2">
+            <a:schemeClr val="accent1">
+              <a:shade val="50000"/>
+            </a:schemeClr>
+          </a:lnRef>
+          <a:fillRef idx="1">
+            <a:schemeClr val="accent1"/>
+          </a:fillRef>
+          <a:effectRef idx="0">
+            <a:schemeClr val="accent1"/>
+          </a:effectRef>
+          <a:fontRef idx="minor">
+            <a:schemeClr val="lt1"/>
+          </a:fontRef>
+        </p:style>
+        <p:txBody>
+          <a:bodyPr rtlCol="0" anchor="ctr"/>
+          <a:lstStyle/>
+          <a:p>
+            <a:pPr algn="ctr"/>
+            <a:endParaRPr lang="tr-TR"/>
+          </a:p>
+        </p:txBody>
+      </p:sp>
+      <p:sp>
+        <p:nvSpPr>
+          <p:cNvPr id="28" name="TextBox 27"/>
+          <p:cNvSpPr txBox="1"/>
+          <p:nvPr/>
+        </p:nvSpPr>
+        <p:spPr>
+          <a:xfrm>
+            <a:off x="7510695" y="2282571"/>
+            <a:ext cx="3962400" cy="369332"/>
+          </a:xfrm>
+          <a:prstGeom prst="rect">
+            <a:avLst/>
+          </a:prstGeom>
+          <a:noFill/>
+        </p:spPr>
+        <p:txBody>
+          <a:bodyPr wrap="square" rtlCol="0">
+            <a:spAutoFit/>
+          </a:bodyPr>
+          <a:lstStyle/>
+          <a:p>
+            <a:r>
+              <a:rPr lang="tr-TR" dirty="0" smtClean="0"/>
+              <a:t>2W loss for 50K temp. increase</a:t>
+            </a:r>
+            <a:endParaRPr lang="tr-TR" dirty="0"/>
+          </a:p>
+        </p:txBody>
+      </p:sp>
+      <p:pic>
+        <p:nvPicPr>
+          <p:cNvPr id="29" name="Picture 28"/>
+          <p:cNvPicPr>
+            <a:picLocks noChangeAspect="1"/>
+          </p:cNvPicPr>
+          <p:nvPr/>
+        </p:nvPicPr>
+        <p:blipFill rotWithShape="1">
+          <a:blip r:embed="rId6"/>
+          <a:srcRect r="11320"/>
+          <a:stretch/>
+        </p:blipFill>
+        <p:spPr>
+          <a:xfrm>
+            <a:off x="295296" y="3950582"/>
+            <a:ext cx="2604922" cy="2405768"/>
+          </a:xfrm>
+          <a:prstGeom prst="rect">
+            <a:avLst/>
+          </a:prstGeom>
+        </p:spPr>
+      </p:pic>
+    </p:spTree>
+    <p:extLst>
+      <p:ext uri="{BB962C8B-B14F-4D97-AF65-F5344CB8AC3E}">
+        <p14:creationId xmlns:p14="http://schemas.microsoft.com/office/powerpoint/2010/main" val="2747982301"/>
+      </p:ext>
+    </p:extLst>
+  </p:cSld>
+  <p:clrMapOvr>
+    <a:masterClrMapping/>
+  </p:clrMapOvr>
+  <p:timing>
+    <p:tnLst>
+      <p:par>
+        <p:cTn id="1" dur="indefinite" restart="never" nodeType="tmRoot"/>
+      </p:par>
+    </p:tnLst>
+  </p:timing>
+</p:sld>
+</file>
+
+<file path=ppt/slides/slide6.xml><?xml version="1.0" encoding="utf-8"?>
+<p:sld xmlns:a="http://schemas.openxmlformats.org/drawingml/2006/main" xmlns:r="http://schemas.openxmlformats.org/officeDocument/2006/relationships" xmlns:p="http://schemas.openxmlformats.org/presentationml/2006/main">
+  <p:cSld>
+    <p:spTree>
+      <p:nvGrpSpPr>
+        <p:cNvPr id="1" name=""/>
+        <p:cNvGrpSpPr/>
+        <p:nvPr/>
+      </p:nvGrpSpPr>
+      <p:grpSpPr>
+        <a:xfrm>
+          <a:off x="0" y="0"/>
+          <a:ext cx="0" cy="0"/>
+          <a:chOff x="0" y="0"/>
+          <a:chExt cx="0" cy="0"/>
+        </a:xfrm>
+      </p:grpSpPr>
+      <p:pic>
+        <p:nvPicPr>
+          <p:cNvPr id="3" name="Picture 2"/>
+          <p:cNvPicPr>
+            <a:picLocks noChangeAspect="1"/>
+          </p:cNvPicPr>
+          <p:nvPr/>
+        </p:nvPicPr>
+        <p:blipFill>
+          <a:blip r:embed="rId2"/>
+          <a:stretch>
+            <a:fillRect/>
+          </a:stretch>
+        </p:blipFill>
+        <p:spPr>
+          <a:xfrm>
+            <a:off x="553915" y="1429810"/>
+            <a:ext cx="5838825" cy="2047875"/>
+          </a:xfrm>
+          <a:prstGeom prst="rect">
+            <a:avLst/>
+          </a:prstGeom>
+        </p:spPr>
+      </p:pic>
+      <p:sp>
+        <p:nvSpPr>
+          <p:cNvPr id="4" name="Slide Number Placeholder 3"/>
+          <p:cNvSpPr>
+            <a:spLocks noGrp="1"/>
+          </p:cNvSpPr>
+          <p:nvPr>
+            <p:ph type="sldNum" sz="quarter" idx="12"/>
+          </p:nvPr>
+        </p:nvSpPr>
+        <p:spPr/>
+        <p:txBody>
+          <a:bodyPr/>
+          <a:lstStyle/>
+          <a:p>
+            <a:fld id="{178508F5-8E49-4F57-B165-331DE2AB85B8}" type="slidenum">
+              <a:rPr lang="tr-TR" sz="1800" smtClean="0"/>
+              <a:t>6</a:t>
+            </a:fld>
+            <a:endParaRPr lang="tr-TR" sz="1800" dirty="0"/>
+          </a:p>
+        </p:txBody>
+      </p:sp>
+      <p:sp>
+        <p:nvSpPr>
+          <p:cNvPr id="5" name="TextBox 4"/>
+          <p:cNvSpPr txBox="1"/>
+          <p:nvPr/>
+        </p:nvSpPr>
+        <p:spPr>
+          <a:xfrm>
+            <a:off x="465992" y="219808"/>
+            <a:ext cx="6268916" cy="523220"/>
+          </a:xfrm>
+          <a:prstGeom prst="rect">
+            <a:avLst/>
+          </a:prstGeom>
+          <a:noFill/>
+        </p:spPr>
+        <p:txBody>
+          <a:bodyPr wrap="square" rtlCol="0">
+            <a:spAutoFit/>
+          </a:bodyPr>
+          <a:lstStyle/>
+          <a:p>
+            <a:r>
+              <a:rPr lang="tr-TR" sz="2800" dirty="0" smtClean="0"/>
+              <a:t>Verification of Magnetic Design</a:t>
+            </a:r>
+            <a:endParaRPr lang="tr-TR" sz="2800" dirty="0"/>
+          </a:p>
+        </p:txBody>
+      </p:sp>
+      <p:sp>
+        <p:nvSpPr>
+          <p:cNvPr id="2" name="TextBox 1"/>
+          <p:cNvSpPr txBox="1"/>
+          <p:nvPr/>
+        </p:nvSpPr>
+        <p:spPr>
+          <a:xfrm>
+            <a:off x="483577" y="931985"/>
+            <a:ext cx="6330461" cy="369332"/>
+          </a:xfrm>
+          <a:prstGeom prst="rect">
+            <a:avLst/>
+          </a:prstGeom>
+          <a:noFill/>
+        </p:spPr>
+        <p:txBody>
+          <a:bodyPr wrap="square" rtlCol="0">
+            <a:spAutoFit/>
+          </a:bodyPr>
+          <a:lstStyle/>
+          <a:p>
+            <a:r>
+              <a:rPr lang="tr-TR" dirty="0" smtClean="0"/>
+              <a:t>Selected Inductor Parameters</a:t>
+            </a:r>
+            <a:endParaRPr lang="tr-TR" dirty="0"/>
+          </a:p>
+        </p:txBody>
+      </p:sp>
+      <p:sp>
+        <p:nvSpPr>
+          <p:cNvPr id="7" name="Oval 6"/>
+          <p:cNvSpPr/>
+          <p:nvPr/>
+        </p:nvSpPr>
+        <p:spPr>
+          <a:xfrm>
+            <a:off x="4633546" y="2059709"/>
+            <a:ext cx="511109" cy="265854"/>
+          </a:xfrm>
+          <a:prstGeom prst="ellipse">
+            <a:avLst/>
+          </a:prstGeom>
+          <a:noFill/>
+          <a:ln w="38100">
+            <a:solidFill>
+              <a:srgbClr val="00B050"/>
+            </a:solidFill>
+          </a:ln>
+        </p:spPr>
+        <p:style>
+          <a:lnRef idx="2">
+            <a:schemeClr val="accent1">
+              <a:shade val="50000"/>
+            </a:schemeClr>
+          </a:lnRef>
+          <a:fillRef idx="1">
+            <a:schemeClr val="accent1"/>
+          </a:fillRef>
+          <a:effectRef idx="0">
+            <a:schemeClr val="accent1"/>
+          </a:effectRef>
+          <a:fontRef idx="minor">
+            <a:schemeClr val="lt1"/>
+          </a:fontRef>
+        </p:style>
+        <p:txBody>
+          <a:bodyPr rtlCol="0" anchor="ctr"/>
+          <a:lstStyle/>
+          <a:p>
+            <a:pPr algn="ctr"/>
+            <a:endParaRPr lang="tr-TR"/>
+          </a:p>
+        </p:txBody>
+      </p:sp>
+      <p:sp>
+        <p:nvSpPr>
+          <p:cNvPr id="16" name="Oval 15"/>
+          <p:cNvSpPr/>
+          <p:nvPr/>
+        </p:nvSpPr>
+        <p:spPr>
+          <a:xfrm>
+            <a:off x="4633546" y="2586583"/>
+            <a:ext cx="511109" cy="265854"/>
+          </a:xfrm>
+          <a:prstGeom prst="ellipse">
+            <a:avLst/>
+          </a:prstGeom>
+          <a:noFill/>
+          <a:ln w="38100">
+            <a:solidFill>
+              <a:srgbClr val="00B050"/>
+            </a:solidFill>
+          </a:ln>
+        </p:spPr>
+        <p:style>
+          <a:lnRef idx="2">
+            <a:schemeClr val="accent1">
+              <a:shade val="50000"/>
+            </a:schemeClr>
+          </a:lnRef>
+          <a:fillRef idx="1">
+            <a:schemeClr val="accent1"/>
+          </a:fillRef>
+          <a:effectRef idx="0">
+            <a:schemeClr val="accent1"/>
+          </a:effectRef>
+          <a:fontRef idx="minor">
+            <a:schemeClr val="lt1"/>
+          </a:fontRef>
+        </p:style>
+        <p:txBody>
+          <a:bodyPr rtlCol="0" anchor="ctr"/>
+          <a:lstStyle/>
+          <a:p>
+            <a:pPr algn="ctr"/>
+            <a:endParaRPr lang="tr-TR"/>
+          </a:p>
+        </p:txBody>
+      </p:sp>
+      <p:sp>
+        <p:nvSpPr>
+          <p:cNvPr id="23" name="Oval 22"/>
+          <p:cNvSpPr/>
+          <p:nvPr/>
+        </p:nvSpPr>
+        <p:spPr>
+          <a:xfrm>
+            <a:off x="4633546" y="2870489"/>
+            <a:ext cx="511109" cy="265854"/>
+          </a:xfrm>
+          <a:prstGeom prst="ellipse">
+            <a:avLst/>
+          </a:prstGeom>
+          <a:noFill/>
+          <a:ln w="38100">
+            <a:solidFill>
+              <a:srgbClr val="00B050"/>
+            </a:solidFill>
+          </a:ln>
+        </p:spPr>
+        <p:style>
+          <a:lnRef idx="2">
+            <a:schemeClr val="accent1">
+              <a:shade val="50000"/>
+            </a:schemeClr>
+          </a:lnRef>
+          <a:fillRef idx="1">
+            <a:schemeClr val="accent1"/>
+          </a:fillRef>
+          <a:effectRef idx="0">
+            <a:schemeClr val="accent1"/>
+          </a:effectRef>
+          <a:fontRef idx="minor">
+            <a:schemeClr val="lt1"/>
+          </a:fontRef>
+        </p:style>
+        <p:txBody>
+          <a:bodyPr rtlCol="0" anchor="ctr"/>
+          <a:lstStyle/>
+          <a:p>
+            <a:pPr algn="ctr"/>
+            <a:endParaRPr lang="tr-TR"/>
+          </a:p>
+        </p:txBody>
+      </p:sp>
+      <p:sp>
+        <p:nvSpPr>
+          <p:cNvPr id="27" name="Oval 26"/>
+          <p:cNvSpPr/>
+          <p:nvPr/>
+        </p:nvSpPr>
+        <p:spPr>
+          <a:xfrm>
+            <a:off x="4633544" y="2334310"/>
+            <a:ext cx="511109" cy="265854"/>
+          </a:xfrm>
+          <a:prstGeom prst="ellipse">
+            <a:avLst/>
+          </a:prstGeom>
+          <a:noFill/>
+          <a:ln w="38100">
+            <a:solidFill>
+              <a:srgbClr val="00B050"/>
+            </a:solidFill>
+          </a:ln>
+        </p:spPr>
+        <p:style>
+          <a:lnRef idx="2">
+            <a:schemeClr val="accent1">
+              <a:shade val="50000"/>
+            </a:schemeClr>
+          </a:lnRef>
+          <a:fillRef idx="1">
+            <a:schemeClr val="accent1"/>
+          </a:fillRef>
+          <a:effectRef idx="0">
+            <a:schemeClr val="accent1"/>
+          </a:effectRef>
+          <a:fontRef idx="minor">
+            <a:schemeClr val="lt1"/>
+          </a:fontRef>
+        </p:style>
+        <p:txBody>
+          <a:bodyPr rtlCol="0" anchor="ctr"/>
+          <a:lstStyle/>
+          <a:p>
+            <a:pPr algn="ctr"/>
+            <a:endParaRPr lang="tr-TR"/>
+          </a:p>
+        </p:txBody>
+      </p:sp>
+      <p:grpSp>
+        <p:nvGrpSpPr>
+          <p:cNvPr id="8" name="Group 7"/>
+          <p:cNvGrpSpPr/>
+          <p:nvPr/>
+        </p:nvGrpSpPr>
+        <p:grpSpPr>
+          <a:xfrm>
+            <a:off x="6457395" y="1052443"/>
+            <a:ext cx="5060738" cy="3334134"/>
+            <a:chOff x="6457395" y="1052443"/>
+            <a:chExt cx="5060738" cy="3334134"/>
+          </a:xfrm>
+        </p:grpSpPr>
+        <p:pic>
+          <p:nvPicPr>
+            <p:cNvPr id="1026" name="Picture 2" descr="dowell curves ile ilgili gÃ¶rsel sonucu"/>
+            <p:cNvPicPr>
+              <a:picLocks noChangeAspect="1" noChangeArrowheads="1"/>
+            </p:cNvPicPr>
+            <p:nvPr/>
+          </p:nvPicPr>
+          <p:blipFill>
+            <a:blip r:embed="rId3">
+              <a:extLst>
+                <a:ext uri="{28A0092B-C50C-407E-A947-70E740481C1C}">
+                  <a14:useLocalDpi xmlns:a14="http://schemas.microsoft.com/office/drawing/2010/main" val="0"/>
+                </a:ext>
+              </a:extLst>
+            </a:blip>
+            <a:srcRect/>
+            <a:stretch>
+              <a:fillRect/>
+            </a:stretch>
+          </p:blipFill>
+          <p:spPr bwMode="auto">
+            <a:xfrm>
+              <a:off x="6457395" y="1052443"/>
+              <a:ext cx="5060738" cy="3334134"/>
+            </a:xfrm>
+            <a:prstGeom prst="rect">
+              <a:avLst/>
+            </a:prstGeom>
+            <a:noFill/>
+            <a:extLst>
+              <a:ext uri="{909E8E84-426E-40DD-AFC4-6F175D3DCCD1}">
+                <a14:hiddenFill xmlns:a14="http://schemas.microsoft.com/office/drawing/2010/main">
+                  <a:solidFill>
+                    <a:srgbClr val="FFFFFF"/>
+                  </a:solidFill>
+                </a14:hiddenFill>
+              </a:ext>
+            </a:extLst>
+          </p:spPr>
+        </p:pic>
+        <p:sp>
+          <p:nvSpPr>
+            <p:cNvPr id="6" name="5-Point Star 5"/>
+            <p:cNvSpPr/>
+            <p:nvPr/>
+          </p:nvSpPr>
+          <p:spPr>
+            <a:xfrm flipV="1">
+              <a:off x="10897493" y="2719510"/>
+              <a:ext cx="220980" cy="195023"/>
+            </a:xfrm>
+            <a:prstGeom prst="star5">
+              <a:avLst/>
+            </a:prstGeom>
+            <a:solidFill>
+              <a:srgbClr val="FF0000"/>
+            </a:solidFill>
+            <a:ln>
+              <a:solidFill>
+                <a:srgbClr val="FF0000"/>
+              </a:solidFill>
+            </a:ln>
+          </p:spPr>
+          <p:style>
+            <a:lnRef idx="2">
+              <a:schemeClr val="accent1">
+                <a:shade val="50000"/>
+              </a:schemeClr>
+            </a:lnRef>
+            <a:fillRef idx="1">
+              <a:schemeClr val="accent1"/>
+            </a:fillRef>
+            <a:effectRef idx="0">
+              <a:schemeClr val="accent1"/>
+            </a:effectRef>
+            <a:fontRef idx="minor">
+              <a:schemeClr val="lt1"/>
+            </a:fontRef>
+          </p:style>
+          <p:txBody>
+            <a:bodyPr rtlCol="0" anchor="ctr"/>
+            <a:lstStyle/>
+            <a:p>
+              <a:pPr algn="ctr"/>
+              <a:endParaRPr lang="tr-TR"/>
+            </a:p>
+          </p:txBody>
+        </p:sp>
+      </p:grpSp>
+      <p:sp>
+        <p:nvSpPr>
+          <p:cNvPr id="10" name="TextBox 9"/>
+          <p:cNvSpPr txBox="1"/>
+          <p:nvPr/>
+        </p:nvSpPr>
+        <p:spPr>
+          <a:xfrm>
+            <a:off x="553915" y="4017930"/>
+            <a:ext cx="5418260" cy="923330"/>
+          </a:xfrm>
+          <a:prstGeom prst="rect">
+            <a:avLst/>
+          </a:prstGeom>
+          <a:noFill/>
+        </p:spPr>
+        <p:txBody>
+          <a:bodyPr wrap="square" rtlCol="0">
+            <a:spAutoFit/>
+          </a:bodyPr>
+          <a:lstStyle/>
+          <a:p>
+            <a:r>
+              <a:rPr lang="el-GR" dirty="0" smtClean="0"/>
+              <a:t>δ</a:t>
+            </a:r>
+            <a:r>
+              <a:rPr lang="tr-TR" dirty="0" smtClean="0"/>
+              <a:t> = 92.2 </a:t>
+            </a:r>
+            <a:r>
+              <a:rPr lang="el-GR" dirty="0" smtClean="0"/>
+              <a:t>μ</a:t>
+            </a:r>
+            <a:r>
+              <a:rPr lang="tr-TR" dirty="0" smtClean="0"/>
+              <a:t>m &amp; 700 </a:t>
+            </a:r>
+            <a:r>
+              <a:rPr lang="el-GR" dirty="0"/>
+              <a:t>μ</a:t>
+            </a:r>
+            <a:r>
+              <a:rPr lang="tr-TR" dirty="0"/>
+              <a:t>m </a:t>
+            </a:r>
+            <a:r>
+              <a:rPr lang="tr-TR" dirty="0" smtClean="0"/>
+              <a:t>pad thickness -&gt; Q = 7.6</a:t>
+            </a:r>
+          </a:p>
+          <a:p>
+            <a:r>
+              <a:rPr lang="tr-TR" dirty="0" smtClean="0"/>
+              <a:t>Rac ≈ 8 * Rdc -&gt; Rac = 7.04 mohm</a:t>
+            </a:r>
+          </a:p>
+          <a:p>
+            <a:r>
+              <a:rPr lang="tr-TR" b="1" dirty="0" smtClean="0"/>
+              <a:t>0.61 W </a:t>
+            </a:r>
+            <a:r>
+              <a:rPr lang="tr-TR" dirty="0" smtClean="0"/>
+              <a:t>Inductor Winding Loss</a:t>
+            </a:r>
+            <a:endParaRPr lang="tr-TR" dirty="0"/>
+          </a:p>
+        </p:txBody>
+      </p:sp>
+    </p:spTree>
+    <p:extLst>
+      <p:ext uri="{BB962C8B-B14F-4D97-AF65-F5344CB8AC3E}">
+        <p14:creationId xmlns:p14="http://schemas.microsoft.com/office/powerpoint/2010/main" val="2102098283"/>
+      </p:ext>
+    </p:extLst>
+  </p:cSld>
+  <p:clrMapOvr>
+    <a:masterClrMapping/>
+  </p:clrMapOvr>
+  <p:timing>
+    <p:tnLst>
+      <p:par>
+        <p:cTn id="1" dur="indefinite" restart="never" nodeType="tmRoot"/>
+      </p:par>
+    </p:tnLst>
+  </p:timing>
+</p:sld>
+</file>
+
+<file path=ppt/slides/slide7.xml><?xml version="1.0" encoding="utf-8"?>
+<p:sld xmlns:a="http://schemas.openxmlformats.org/drawingml/2006/main" xmlns:r="http://schemas.openxmlformats.org/officeDocument/2006/relationships" xmlns:p="http://schemas.openxmlformats.org/presentationml/2006/main">
+  <p:cSld>
+    <p:spTree>
+      <p:nvGrpSpPr>
+        <p:cNvPr id="1" name=""/>
+        <p:cNvGrpSpPr/>
+        <p:nvPr/>
+      </p:nvGrpSpPr>
+      <p:grpSpPr>
+        <a:xfrm>
+          <a:off x="0" y="0"/>
+          <a:ext cx="0" cy="0"/>
+          <a:chOff x="0" y="0"/>
+          <a:chExt cx="0" cy="0"/>
+        </a:xfrm>
+      </p:grpSpPr>
+      <p:sp>
+        <p:nvSpPr>
+          <p:cNvPr id="4" name="Slide Number Placeholder 3"/>
+          <p:cNvSpPr>
+            <a:spLocks noGrp="1"/>
+          </p:cNvSpPr>
+          <p:nvPr>
+            <p:ph type="sldNum" sz="quarter" idx="12"/>
+          </p:nvPr>
+        </p:nvSpPr>
+        <p:spPr/>
+        <p:txBody>
+          <a:bodyPr/>
+          <a:lstStyle/>
+          <a:p>
+            <a:fld id="{178508F5-8E49-4F57-B165-331DE2AB85B8}" type="slidenum">
+              <a:rPr lang="tr-TR" sz="1800" smtClean="0"/>
+              <a:t>7</a:t>
+            </a:fld>
+            <a:endParaRPr lang="tr-TR" sz="1800" dirty="0"/>
+          </a:p>
+        </p:txBody>
+      </p:sp>
+      <p:sp>
+        <p:nvSpPr>
+          <p:cNvPr id="5" name="TextBox 4"/>
+          <p:cNvSpPr txBox="1"/>
+          <p:nvPr/>
+        </p:nvSpPr>
+        <p:spPr>
+          <a:xfrm>
+            <a:off x="465992" y="219808"/>
+            <a:ext cx="6268916" cy="523220"/>
+          </a:xfrm>
+          <a:prstGeom prst="rect">
+            <a:avLst/>
+          </a:prstGeom>
+          <a:noFill/>
+        </p:spPr>
+        <p:txBody>
+          <a:bodyPr wrap="square" rtlCol="0">
+            <a:spAutoFit/>
+          </a:bodyPr>
+          <a:lstStyle/>
+          <a:p>
+            <a:r>
+              <a:rPr lang="tr-TR" sz="2800" dirty="0" smtClean="0"/>
+              <a:t>Loss Analysis</a:t>
+            </a:r>
+            <a:endParaRPr lang="tr-TR" sz="2800" dirty="0"/>
+          </a:p>
+        </p:txBody>
+      </p:sp>
+      <p:graphicFrame>
+        <p:nvGraphicFramePr>
+          <p:cNvPr id="14" name="Table 13"/>
+          <p:cNvGraphicFramePr>
+            <a:graphicFrameLocks noGrp="1"/>
+          </p:cNvGraphicFramePr>
+          <p:nvPr>
+            <p:extLst>
+              <p:ext uri="{D42A27DB-BD31-4B8C-83A1-F6EECF244321}">
+                <p14:modId xmlns:p14="http://schemas.microsoft.com/office/powerpoint/2010/main" val="653848783"/>
+              </p:ext>
+            </p:extLst>
+          </p:nvPr>
+        </p:nvGraphicFramePr>
+        <p:xfrm>
+          <a:off x="932873" y="785890"/>
+          <a:ext cx="10695710" cy="3235960"/>
+        </p:xfrm>
+        <a:graphic>
+          <a:graphicData uri="http://schemas.openxmlformats.org/drawingml/2006/table">
+            <a:tbl>
+              <a:tblPr firstRow="1" bandRow="1">
+                <a:tableStyleId>{7DF18680-E054-41AD-8BC1-D1AEF772440D}</a:tableStyleId>
+              </a:tblPr>
+              <a:tblGrid>
+                <a:gridCol w="1850165">
+                  <a:extLst>
+                    <a:ext uri="{9D8B030D-6E8A-4147-A177-3AD203B41FA5}">
+                      <a16:colId xmlns:a16="http://schemas.microsoft.com/office/drawing/2014/main" val="3742650035"/>
+                    </a:ext>
+                  </a:extLst>
+                </a:gridCol>
+                <a:gridCol w="2960265">
+                  <a:extLst>
+                    <a:ext uri="{9D8B030D-6E8A-4147-A177-3AD203B41FA5}">
+                      <a16:colId xmlns:a16="http://schemas.microsoft.com/office/drawing/2014/main" val="2746093398"/>
+                    </a:ext>
+                  </a:extLst>
+                </a:gridCol>
+                <a:gridCol w="2942640">
+                  <a:extLst>
+                    <a:ext uri="{9D8B030D-6E8A-4147-A177-3AD203B41FA5}">
+                      <a16:colId xmlns:a16="http://schemas.microsoft.com/office/drawing/2014/main" val="2681478820"/>
+                    </a:ext>
+                  </a:extLst>
+                </a:gridCol>
+                <a:gridCol w="2942640">
+                  <a:extLst>
+                    <a:ext uri="{9D8B030D-6E8A-4147-A177-3AD203B41FA5}">
+                      <a16:colId xmlns:a16="http://schemas.microsoft.com/office/drawing/2014/main" val="1819645119"/>
+                    </a:ext>
+                  </a:extLst>
+                </a:gridCol>
+              </a:tblGrid>
+              <a:tr h="370840">
+                <a:tc>
+                  <a:txBody>
+                    <a:bodyPr/>
+                    <a:lstStyle/>
+                    <a:p>
+                      <a:endParaRPr lang="tr-TR" dirty="0"/>
+                    </a:p>
+                  </a:txBody>
+                  <a:tcPr/>
+                </a:tc>
+                <a:tc>
+                  <a:txBody>
+                    <a:bodyPr/>
+                    <a:lstStyle/>
+                    <a:p>
+                      <a:pPr algn="ctr"/>
+                      <a:r>
+                        <a:rPr lang="tr-TR" dirty="0" smtClean="0"/>
+                        <a:t>Results</a:t>
+                      </a:r>
+                      <a:r>
+                        <a:rPr lang="tr-TR" baseline="0" dirty="0" smtClean="0"/>
+                        <a:t> for 500 kHz</a:t>
+                      </a:r>
+                      <a:br>
+                        <a:rPr lang="tr-TR" baseline="0" dirty="0" smtClean="0"/>
+                      </a:br>
+                      <a:r>
+                        <a:rPr lang="tr-TR" baseline="0" dirty="0" smtClean="0"/>
+                        <a:t>(Ron = 10R, Roff = 2R)</a:t>
+                      </a:r>
+                      <a:endParaRPr lang="tr-TR" dirty="0"/>
+                    </a:p>
+                  </a:txBody>
+                  <a:tcPr/>
+                </a:tc>
+                <a:tc>
+                  <a:txBody>
+                    <a:bodyPr/>
+                    <a:lstStyle/>
+                    <a:p>
+                      <a:pPr algn="ctr"/>
+                      <a:r>
+                        <a:rPr lang="tr-TR" dirty="0" smtClean="0"/>
+                        <a:t>Results</a:t>
+                      </a:r>
+                      <a:r>
+                        <a:rPr lang="tr-TR" baseline="0" dirty="0" smtClean="0"/>
+                        <a:t> for 500 kHz</a:t>
+                      </a:r>
+                      <a:br>
+                        <a:rPr lang="tr-TR" baseline="0" dirty="0" smtClean="0"/>
+                      </a:br>
+                      <a:r>
+                        <a:rPr lang="tr-TR" baseline="0" dirty="0" smtClean="0"/>
+                        <a:t>(Ron = </a:t>
+                      </a:r>
+                      <a:r>
+                        <a:rPr lang="tr-TR" b="1" u="sng" baseline="0" dirty="0" smtClean="0"/>
+                        <a:t>20R</a:t>
+                      </a:r>
+                      <a:r>
+                        <a:rPr lang="tr-TR" baseline="0" dirty="0" smtClean="0"/>
+                        <a:t>, Roff = </a:t>
+                      </a:r>
+                      <a:r>
+                        <a:rPr lang="tr-TR" u="sng" baseline="0" dirty="0" smtClean="0"/>
+                        <a:t>5R</a:t>
+                      </a:r>
+                      <a:r>
+                        <a:rPr lang="tr-TR" baseline="0" dirty="0" smtClean="0"/>
+                        <a:t>)</a:t>
+                      </a:r>
+                      <a:endParaRPr lang="tr-TR" dirty="0"/>
+                    </a:p>
+                  </a:txBody>
+                  <a:tcPr/>
+                </a:tc>
+                <a:tc>
+                  <a:txBody>
+                    <a:bodyPr/>
+                    <a:lstStyle/>
+                    <a:p>
+                      <a:pPr algn="ctr"/>
+                      <a:r>
+                        <a:rPr lang="tr-TR" dirty="0" smtClean="0"/>
+                        <a:t>Results</a:t>
+                      </a:r>
+                      <a:r>
+                        <a:rPr lang="tr-TR" baseline="0" dirty="0" smtClean="0"/>
+                        <a:t> for 500 kHz</a:t>
+                      </a:r>
+                      <a:br>
+                        <a:rPr lang="tr-TR" baseline="0" dirty="0" smtClean="0"/>
+                      </a:br>
+                      <a:r>
+                        <a:rPr lang="tr-TR" baseline="0" dirty="0" smtClean="0"/>
+                        <a:t>(Ron = 20R, Roff = </a:t>
+                      </a:r>
+                      <a:r>
+                        <a:rPr lang="tr-TR" u="sng" baseline="0" dirty="0" smtClean="0"/>
+                        <a:t>2R</a:t>
+                      </a:r>
+                      <a:r>
+                        <a:rPr lang="tr-TR" baseline="0" dirty="0" smtClean="0"/>
+                        <a:t>)</a:t>
+                      </a:r>
+                      <a:endParaRPr lang="tr-TR" dirty="0"/>
+                    </a:p>
+                  </a:txBody>
+                  <a:tcPr/>
+                </a:tc>
+                <a:extLst>
+                  <a:ext uri="{0D108BD9-81ED-4DB2-BD59-A6C34878D82A}">
+                    <a16:rowId xmlns:a16="http://schemas.microsoft.com/office/drawing/2014/main" val="3787613991"/>
+                  </a:ext>
+                </a:extLst>
+              </a:tr>
+              <a:tr h="370840">
+                <a:tc>
+                  <a:txBody>
+                    <a:bodyPr/>
+                    <a:lstStyle/>
+                    <a:p>
+                      <a:pPr algn="l"/>
+                      <a:r>
+                        <a:rPr lang="tr-TR" dirty="0" smtClean="0"/>
+                        <a:t>I(C)</a:t>
+                      </a:r>
+                      <a:endParaRPr lang="tr-TR" dirty="0"/>
+                    </a:p>
+                  </a:txBody>
+                  <a:tcPr/>
+                </a:tc>
+                <a:tc>
+                  <a:txBody>
+                    <a:bodyPr/>
+                    <a:lstStyle/>
+                    <a:p>
+                      <a:pPr algn="ctr"/>
+                      <a:r>
+                        <a:rPr lang="tr-TR" dirty="0" smtClean="0"/>
+                        <a:t>5.718 Arms</a:t>
+                      </a:r>
+                      <a:r>
+                        <a:rPr lang="tr-TR" baseline="0" dirty="0" smtClean="0"/>
+                        <a:t> @1MHz</a:t>
+                      </a:r>
+                      <a:endParaRPr lang="tr-TR" dirty="0"/>
+                    </a:p>
+                  </a:txBody>
+                  <a:tcPr/>
+                </a:tc>
+                <a:tc>
+                  <a:txBody>
+                    <a:bodyPr/>
+                    <a:lstStyle/>
+                    <a:p>
+                      <a:pPr algn="ctr"/>
+                      <a:r>
+                        <a:rPr lang="tr-TR" dirty="0" smtClean="0"/>
+                        <a:t>5.718 Arms</a:t>
+                      </a:r>
+                      <a:r>
+                        <a:rPr lang="tr-TR" baseline="0" dirty="0" smtClean="0"/>
+                        <a:t> @1MHz</a:t>
+                      </a:r>
+                      <a:endParaRPr lang="tr-TR" dirty="0"/>
+                    </a:p>
+                  </a:txBody>
+                  <a:tcPr/>
+                </a:tc>
+                <a:tc>
+                  <a:txBody>
+                    <a:bodyPr/>
+                    <a:lstStyle/>
+                    <a:p>
+                      <a:pPr algn="ctr"/>
+                      <a:r>
+                        <a:rPr lang="tr-TR" dirty="0" smtClean="0"/>
+                        <a:t>5.718 Arms</a:t>
+                      </a:r>
+                      <a:r>
+                        <a:rPr lang="tr-TR" baseline="0" dirty="0" smtClean="0"/>
+                        <a:t> @1MHz</a:t>
+                      </a:r>
+                      <a:endParaRPr lang="tr-TR" dirty="0"/>
+                    </a:p>
+                  </a:txBody>
+                  <a:tcPr/>
+                </a:tc>
+                <a:extLst>
+                  <a:ext uri="{0D108BD9-81ED-4DB2-BD59-A6C34878D82A}">
+                    <a16:rowId xmlns:a16="http://schemas.microsoft.com/office/drawing/2014/main" val="4013694663"/>
+                  </a:ext>
+                </a:extLst>
+              </a:tr>
+              <a:tr h="370840">
+                <a:tc>
+                  <a:txBody>
+                    <a:bodyPr/>
+                    <a:lstStyle/>
+                    <a:p>
+                      <a:pPr algn="l"/>
+                      <a:r>
+                        <a:rPr lang="tr-TR" dirty="0" smtClean="0"/>
+                        <a:t>I(L)</a:t>
+                      </a:r>
+                      <a:endParaRPr lang="tr-TR" dirty="0"/>
+                    </a:p>
+                  </a:txBody>
+                  <a:tcPr/>
+                </a:tc>
+                <a:tc>
+                  <a:txBody>
+                    <a:bodyPr/>
+                    <a:lstStyle/>
+                    <a:p>
+                      <a:pPr algn="ctr"/>
+                      <a:r>
+                        <a:rPr lang="tr-TR" dirty="0" smtClean="0"/>
+                        <a:t>13.26 Arms @500</a:t>
+                      </a:r>
+                      <a:r>
+                        <a:rPr lang="tr-TR" baseline="0" dirty="0" smtClean="0"/>
+                        <a:t> kHz</a:t>
+                      </a:r>
+                      <a:endParaRPr lang="tr-TR" dirty="0"/>
+                    </a:p>
+                  </a:txBody>
+                  <a:tcPr/>
+                </a:tc>
+                <a:tc>
+                  <a:txBody>
+                    <a:bodyPr/>
+                    <a:lstStyle/>
+                    <a:p>
+                      <a:pPr algn="ctr"/>
+                      <a:r>
+                        <a:rPr lang="tr-TR" dirty="0" smtClean="0"/>
+                        <a:t>13.26 Arms @500</a:t>
+                      </a:r>
+                      <a:r>
+                        <a:rPr lang="tr-TR" baseline="0" dirty="0" smtClean="0"/>
+                        <a:t> kHz</a:t>
+                      </a:r>
+                      <a:endParaRPr lang="tr-TR" dirty="0"/>
+                    </a:p>
+                  </a:txBody>
+                  <a:tcPr/>
+                </a:tc>
+                <a:tc>
+                  <a:txBody>
+                    <a:bodyPr/>
+                    <a:lstStyle/>
+                    <a:p>
+                      <a:pPr algn="ctr"/>
+                      <a:r>
+                        <a:rPr lang="tr-TR" dirty="0" smtClean="0"/>
+                        <a:t>13.26 Arms @500</a:t>
+                      </a:r>
+                      <a:r>
+                        <a:rPr lang="tr-TR" baseline="0" dirty="0" smtClean="0"/>
+                        <a:t> kHz</a:t>
+                      </a:r>
+                      <a:endParaRPr lang="tr-TR" dirty="0"/>
+                    </a:p>
+                  </a:txBody>
+                  <a:tcPr/>
+                </a:tc>
+                <a:extLst>
+                  <a:ext uri="{0D108BD9-81ED-4DB2-BD59-A6C34878D82A}">
+                    <a16:rowId xmlns:a16="http://schemas.microsoft.com/office/drawing/2014/main" val="19271735"/>
+                  </a:ext>
+                </a:extLst>
+              </a:tr>
+              <a:tr h="370840">
+                <a:tc>
+                  <a:txBody>
+                    <a:bodyPr/>
+                    <a:lstStyle/>
+                    <a:p>
+                      <a:pPr algn="l"/>
+                      <a:r>
+                        <a:rPr lang="tr-TR" dirty="0" smtClean="0"/>
+                        <a:t>Ipeak(L)</a:t>
+                      </a:r>
+                      <a:endParaRPr lang="tr-TR" dirty="0"/>
+                    </a:p>
+                  </a:txBody>
+                  <a:tcPr/>
+                </a:tc>
+                <a:tc>
+                  <a:txBody>
+                    <a:bodyPr/>
+                    <a:lstStyle/>
+                    <a:p>
+                      <a:pPr algn="ctr"/>
+                      <a:r>
+                        <a:rPr lang="tr-TR" dirty="0" smtClean="0"/>
+                        <a:t>25 A,</a:t>
+                      </a:r>
+                      <a:r>
+                        <a:rPr lang="tr-TR" baseline="0" dirty="0" smtClean="0"/>
+                        <a:t> -4.5 A</a:t>
+                      </a:r>
+                      <a:endParaRPr lang="tr-TR" dirty="0"/>
+                    </a:p>
+                  </a:txBody>
+                  <a:tcPr/>
+                </a:tc>
+                <a:tc>
+                  <a:txBody>
+                    <a:bodyPr/>
+                    <a:lstStyle/>
+                    <a:p>
+                      <a:pPr algn="ctr"/>
+                      <a:r>
+                        <a:rPr lang="tr-TR" dirty="0" smtClean="0"/>
+                        <a:t>25 A,</a:t>
+                      </a:r>
+                      <a:r>
+                        <a:rPr lang="tr-TR" baseline="0" dirty="0" smtClean="0"/>
+                        <a:t> -4.5 A</a:t>
+                      </a:r>
+                      <a:endParaRPr lang="tr-TR" dirty="0"/>
+                    </a:p>
+                  </a:txBody>
+                  <a:tcPr/>
+                </a:tc>
+                <a:tc>
+                  <a:txBody>
+                    <a:bodyPr/>
+                    <a:lstStyle/>
+                    <a:p>
+                      <a:pPr algn="ctr"/>
+                      <a:r>
+                        <a:rPr lang="tr-TR" dirty="0" smtClean="0"/>
+                        <a:t>25 A,</a:t>
+                      </a:r>
+                      <a:r>
+                        <a:rPr lang="tr-TR" baseline="0" dirty="0" smtClean="0"/>
+                        <a:t> -4.5 A</a:t>
+                      </a:r>
+                      <a:endParaRPr lang="tr-TR" dirty="0"/>
+                    </a:p>
+                  </a:txBody>
+                  <a:tcPr/>
+                </a:tc>
+                <a:extLst>
+                  <a:ext uri="{0D108BD9-81ED-4DB2-BD59-A6C34878D82A}">
+                    <a16:rowId xmlns:a16="http://schemas.microsoft.com/office/drawing/2014/main" val="460727978"/>
+                  </a:ext>
+                </a:extLst>
+              </a:tr>
+              <a:tr h="370840">
+                <a:tc>
+                  <a:txBody>
+                    <a:bodyPr/>
+                    <a:lstStyle/>
+                    <a:p>
+                      <a:pPr algn="l"/>
+                      <a:r>
+                        <a:rPr lang="tr-TR" dirty="0" smtClean="0"/>
+                        <a:t>Ploss(top switch)</a:t>
+                      </a:r>
+                      <a:endParaRPr lang="tr-TR" dirty="0"/>
+                    </a:p>
+                  </a:txBody>
+                  <a:tcPr/>
+                </a:tc>
+                <a:tc>
+                  <a:txBody>
+                    <a:bodyPr/>
+                    <a:lstStyle/>
+                    <a:p>
+                      <a:pPr algn="ctr"/>
+                      <a:r>
+                        <a:rPr lang="tr-TR" dirty="0" smtClean="0"/>
+                        <a:t>4.923 W</a:t>
+                      </a:r>
+                      <a:endParaRPr lang="tr-TR" dirty="0"/>
+                    </a:p>
+                  </a:txBody>
+                  <a:tcPr/>
+                </a:tc>
+                <a:tc>
+                  <a:txBody>
+                    <a:bodyPr/>
+                    <a:lstStyle/>
+                    <a:p>
+                      <a:pPr algn="ctr"/>
+                      <a:r>
+                        <a:rPr lang="tr-TR" dirty="0" smtClean="0"/>
+                        <a:t>4.87 W</a:t>
+                      </a:r>
+                      <a:endParaRPr lang="tr-TR" dirty="0"/>
+                    </a:p>
+                  </a:txBody>
+                  <a:tcPr/>
+                </a:tc>
+                <a:tc>
+                  <a:txBody>
+                    <a:bodyPr/>
+                    <a:lstStyle/>
+                    <a:p>
+                      <a:pPr algn="ctr"/>
+                      <a:r>
+                        <a:rPr lang="tr-TR" dirty="0" smtClean="0"/>
+                        <a:t>4.6 W</a:t>
+                      </a:r>
+                      <a:endParaRPr lang="tr-TR" dirty="0"/>
+                    </a:p>
+                  </a:txBody>
+                  <a:tcPr/>
+                </a:tc>
+                <a:extLst>
+                  <a:ext uri="{0D108BD9-81ED-4DB2-BD59-A6C34878D82A}">
+                    <a16:rowId xmlns:a16="http://schemas.microsoft.com/office/drawing/2014/main" val="3908604105"/>
+                  </a:ext>
+                </a:extLst>
+              </a:tr>
+              <a:tr h="370840">
+                <a:tc>
+                  <a:txBody>
+                    <a:bodyPr/>
+                    <a:lstStyle/>
+                    <a:p>
+                      <a:pPr marL="0" marR="0" indent="0" algn="l" defTabSz="914400" rtl="0" eaLnBrk="1" fontAlgn="auto" latinLnBrk="0" hangingPunct="1">
+                        <a:lnSpc>
+                          <a:spcPct val="100000"/>
+                        </a:lnSpc>
+                        <a:spcBef>
+                          <a:spcPts val="0"/>
+                        </a:spcBef>
+                        <a:spcAft>
+                          <a:spcPts val="0"/>
+                        </a:spcAft>
+                        <a:buClrTx/>
+                        <a:buSzTx/>
+                        <a:buFontTx/>
+                        <a:buNone/>
+                        <a:tabLst/>
+                        <a:defRPr/>
+                      </a:pPr>
+                      <a:r>
+                        <a:rPr lang="tr-TR" dirty="0" smtClean="0"/>
+                        <a:t>Ploss(bot switch)</a:t>
+                      </a:r>
+                    </a:p>
+                  </a:txBody>
+                  <a:tcPr/>
+                </a:tc>
+                <a:tc>
+                  <a:txBody>
+                    <a:bodyPr/>
+                    <a:lstStyle/>
+                    <a:p>
+                      <a:pPr algn="ctr"/>
+                      <a:r>
+                        <a:rPr lang="tr-TR" dirty="0" smtClean="0"/>
+                        <a:t>3.297 W</a:t>
+                      </a:r>
+                      <a:endParaRPr lang="tr-TR" dirty="0"/>
+                    </a:p>
+                  </a:txBody>
+                  <a:tcPr/>
+                </a:tc>
+                <a:tc>
+                  <a:txBody>
+                    <a:bodyPr/>
+                    <a:lstStyle/>
+                    <a:p>
+                      <a:pPr algn="ctr"/>
+                      <a:r>
+                        <a:rPr lang="tr-TR" dirty="0" smtClean="0"/>
+                        <a:t>3.653 W</a:t>
+                      </a:r>
+                      <a:endParaRPr lang="tr-TR" dirty="0"/>
+                    </a:p>
+                  </a:txBody>
+                  <a:tcPr/>
+                </a:tc>
+                <a:tc>
+                  <a:txBody>
+                    <a:bodyPr/>
+                    <a:lstStyle/>
+                    <a:p>
+                      <a:pPr algn="ctr"/>
+                      <a:r>
+                        <a:rPr lang="tr-TR" dirty="0" smtClean="0"/>
+                        <a:t>3.76 W</a:t>
+                      </a:r>
+                      <a:endParaRPr lang="tr-TR" dirty="0"/>
+                    </a:p>
+                  </a:txBody>
+                  <a:tcPr/>
+                </a:tc>
+                <a:extLst>
+                  <a:ext uri="{0D108BD9-81ED-4DB2-BD59-A6C34878D82A}">
+                    <a16:rowId xmlns:a16="http://schemas.microsoft.com/office/drawing/2014/main" val="2278721399"/>
+                  </a:ext>
+                </a:extLst>
+              </a:tr>
+              <a:tr h="370840">
+                <a:tc>
+                  <a:txBody>
+                    <a:bodyPr/>
+                    <a:lstStyle/>
+                    <a:p>
+                      <a:pPr marL="0" marR="0" indent="0" algn="l" defTabSz="914400" rtl="0" eaLnBrk="1" fontAlgn="auto" latinLnBrk="0" hangingPunct="1">
+                        <a:lnSpc>
+                          <a:spcPct val="100000"/>
+                        </a:lnSpc>
+                        <a:spcBef>
+                          <a:spcPts val="0"/>
+                        </a:spcBef>
+                        <a:spcAft>
+                          <a:spcPts val="0"/>
+                        </a:spcAft>
+                        <a:buClrTx/>
+                        <a:buSzTx/>
+                        <a:buFontTx/>
+                        <a:buNone/>
+                        <a:tabLst/>
+                        <a:defRPr/>
+                      </a:pPr>
+                      <a:r>
+                        <a:rPr lang="tr-TR" dirty="0" smtClean="0"/>
+                        <a:t>Ploss(total)</a:t>
+                      </a:r>
+                    </a:p>
+                  </a:txBody>
+                  <a:tcPr/>
+                </a:tc>
+                <a:tc>
+                  <a:txBody>
+                    <a:bodyPr/>
+                    <a:lstStyle/>
+                    <a:p>
+                      <a:pPr algn="ctr"/>
+                      <a:r>
+                        <a:rPr lang="tr-TR" dirty="0" smtClean="0"/>
+                        <a:t>32.9 W</a:t>
+                      </a:r>
+                      <a:endParaRPr lang="tr-TR" dirty="0"/>
+                    </a:p>
+                  </a:txBody>
+                  <a:tcPr/>
+                </a:tc>
+                <a:tc>
+                  <a:txBody>
+                    <a:bodyPr/>
+                    <a:lstStyle/>
+                    <a:p>
+                      <a:pPr algn="ctr"/>
+                      <a:r>
+                        <a:rPr lang="tr-TR" dirty="0" smtClean="0"/>
+                        <a:t>34.1 W</a:t>
+                      </a:r>
+                      <a:endParaRPr lang="tr-TR" dirty="0"/>
+                    </a:p>
+                  </a:txBody>
+                  <a:tcPr/>
+                </a:tc>
+                <a:tc>
+                  <a:txBody>
+                    <a:bodyPr/>
+                    <a:lstStyle/>
+                    <a:p>
+                      <a:pPr algn="ctr"/>
+                      <a:r>
+                        <a:rPr lang="tr-TR" dirty="0" smtClean="0"/>
+                        <a:t>33.4</a:t>
+                      </a:r>
+                      <a:r>
+                        <a:rPr lang="tr-TR" baseline="0" dirty="0" smtClean="0"/>
+                        <a:t> W</a:t>
+                      </a:r>
+                      <a:endParaRPr lang="tr-TR" dirty="0"/>
+                    </a:p>
+                  </a:txBody>
+                  <a:tcPr/>
+                </a:tc>
+                <a:extLst>
+                  <a:ext uri="{0D108BD9-81ED-4DB2-BD59-A6C34878D82A}">
+                    <a16:rowId xmlns:a16="http://schemas.microsoft.com/office/drawing/2014/main" val="1839603384"/>
+                  </a:ext>
+                </a:extLst>
+              </a:tr>
+              <a:tr h="370840">
+                <a:tc>
+                  <a:txBody>
+                    <a:bodyPr/>
+                    <a:lstStyle/>
+                    <a:p>
+                      <a:pPr marL="0" marR="0" indent="0" algn="l" defTabSz="914400" rtl="0" eaLnBrk="1" fontAlgn="auto" latinLnBrk="0" hangingPunct="1">
+                        <a:lnSpc>
+                          <a:spcPct val="100000"/>
+                        </a:lnSpc>
+                        <a:spcBef>
+                          <a:spcPts val="0"/>
+                        </a:spcBef>
+                        <a:spcAft>
+                          <a:spcPts val="0"/>
+                        </a:spcAft>
+                        <a:buClrTx/>
+                        <a:buSzTx/>
+                        <a:buFontTx/>
+                        <a:buNone/>
+                        <a:tabLst/>
+                        <a:defRPr/>
+                      </a:pPr>
+                      <a:r>
+                        <a:rPr lang="tr-TR" dirty="0" smtClean="0"/>
+                        <a:t>K</a:t>
+                      </a:r>
+                    </a:p>
+                  </a:txBody>
+                  <a:tcPr/>
+                </a:tc>
+                <a:tc>
+                  <a:txBody>
+                    <a:bodyPr/>
+                    <a:lstStyle/>
+                    <a:p>
+                      <a:pPr algn="ctr"/>
+                      <a:r>
+                        <a:rPr lang="tr-TR" dirty="0" smtClean="0"/>
+                        <a:t>3</a:t>
+                      </a:r>
+                      <a:endParaRPr lang="tr-TR" dirty="0"/>
+                    </a:p>
+                  </a:txBody>
+                  <a:tcPr/>
+                </a:tc>
+                <a:tc>
+                  <a:txBody>
+                    <a:bodyPr/>
+                    <a:lstStyle/>
+                    <a:p>
+                      <a:pPr algn="ctr"/>
+                      <a:r>
+                        <a:rPr lang="tr-TR" dirty="0" smtClean="0"/>
+                        <a:t>3</a:t>
+                      </a:r>
+                      <a:endParaRPr lang="tr-TR" dirty="0"/>
+                    </a:p>
+                  </a:txBody>
+                  <a:tcPr/>
+                </a:tc>
+                <a:tc>
+                  <a:txBody>
+                    <a:bodyPr/>
+                    <a:lstStyle/>
+                    <a:p>
+                      <a:pPr algn="ctr"/>
+                      <a:r>
+                        <a:rPr lang="tr-TR" dirty="0" smtClean="0"/>
+                        <a:t>3</a:t>
+                      </a:r>
+                      <a:endParaRPr lang="tr-TR" dirty="0"/>
+                    </a:p>
+                  </a:txBody>
+                  <a:tcPr/>
+                </a:tc>
+                <a:extLst>
+                  <a:ext uri="{0D108BD9-81ED-4DB2-BD59-A6C34878D82A}">
+                    <a16:rowId xmlns:a16="http://schemas.microsoft.com/office/drawing/2014/main" val="2909882164"/>
+                  </a:ext>
+                </a:extLst>
+              </a:tr>
+            </a:tbl>
+          </a:graphicData>
+        </a:graphic>
+      </p:graphicFrame>
+      <p:pic>
+        <p:nvPicPr>
+          <p:cNvPr id="9" name="Picture 8"/>
+          <p:cNvPicPr>
+            <a:picLocks noChangeAspect="1"/>
+          </p:cNvPicPr>
+          <p:nvPr/>
+        </p:nvPicPr>
+        <p:blipFill rotWithShape="1">
+          <a:blip r:embed="rId2"/>
+          <a:srcRect t="1441" b="1086"/>
+          <a:stretch/>
+        </p:blipFill>
+        <p:spPr>
+          <a:xfrm>
+            <a:off x="6219825" y="4391026"/>
+            <a:ext cx="4301376" cy="2176030"/>
+          </a:xfrm>
+          <a:prstGeom prst="rect">
+            <a:avLst/>
+          </a:prstGeom>
+        </p:spPr>
+      </p:pic>
+      <p:pic>
+        <p:nvPicPr>
+          <p:cNvPr id="11" name="Picture 10"/>
+          <p:cNvPicPr>
+            <a:picLocks noChangeAspect="1"/>
+          </p:cNvPicPr>
+          <p:nvPr/>
+        </p:nvPicPr>
+        <p:blipFill rotWithShape="1">
+          <a:blip r:embed="rId3"/>
+          <a:srcRect r="1577" b="1086"/>
+          <a:stretch/>
+        </p:blipFill>
+        <p:spPr>
+          <a:xfrm>
+            <a:off x="1394995" y="4358838"/>
+            <a:ext cx="4370189" cy="2208218"/>
+          </a:xfrm>
+          <a:prstGeom prst="rect">
+            <a:avLst/>
+          </a:prstGeom>
+        </p:spPr>
+      </p:pic>
+      <p:cxnSp>
+        <p:nvCxnSpPr>
+          <p:cNvPr id="13" name="Straight Arrow Connector 12"/>
+          <p:cNvCxnSpPr/>
+          <p:nvPr/>
+        </p:nvCxnSpPr>
+        <p:spPr>
+          <a:xfrm flipH="1">
+            <a:off x="3733800" y="4064712"/>
+            <a:ext cx="411480" cy="326313"/>
+          </a:xfrm>
+          <a:prstGeom prst="straightConnector1">
+            <a:avLst/>
+          </a:prstGeom>
+          <a:ln w="19050">
+            <a:solidFill>
+              <a:srgbClr val="00B050"/>
+            </a:solidFill>
+            <a:tailEnd type="triangle"/>
+          </a:ln>
+        </p:spPr>
+        <p:style>
+          <a:lnRef idx="1">
+            <a:schemeClr val="accent1"/>
+          </a:lnRef>
+          <a:fillRef idx="0">
+            <a:schemeClr val="accent1"/>
+          </a:fillRef>
+          <a:effectRef idx="0">
+            <a:schemeClr val="accent1"/>
+          </a:effectRef>
+          <a:fontRef idx="minor">
+            <a:schemeClr val="tx1"/>
+          </a:fontRef>
+        </p:style>
+      </p:cxnSp>
+      <p:cxnSp>
+        <p:nvCxnSpPr>
+          <p:cNvPr id="22" name="Straight Arrow Connector 21"/>
+          <p:cNvCxnSpPr>
+            <a:endCxn id="9" idx="0"/>
+          </p:cNvCxnSpPr>
+          <p:nvPr/>
+        </p:nvCxnSpPr>
+        <p:spPr>
+          <a:xfrm>
+            <a:off x="7463255" y="4064712"/>
+            <a:ext cx="907258" cy="326314"/>
+          </a:xfrm>
+          <a:prstGeom prst="straightConnector1">
+            <a:avLst/>
+          </a:prstGeom>
+          <a:ln w="19050">
+            <a:solidFill>
+              <a:srgbClr val="00B050"/>
+            </a:solidFill>
+            <a:tailEnd type="triangle"/>
+          </a:ln>
+        </p:spPr>
+        <p:style>
+          <a:lnRef idx="1">
+            <a:schemeClr val="accent1"/>
+          </a:lnRef>
+          <a:fillRef idx="0">
+            <a:schemeClr val="accent1"/>
+          </a:fillRef>
+          <a:effectRef idx="0">
+            <a:schemeClr val="accent1"/>
+          </a:effectRef>
+          <a:fontRef idx="minor">
+            <a:schemeClr val="tx1"/>
+          </a:fontRef>
+        </p:style>
+      </p:cxnSp>
+      <p:sp>
+        <p:nvSpPr>
+          <p:cNvPr id="26" name="Oval 25"/>
+          <p:cNvSpPr/>
+          <p:nvPr/>
+        </p:nvSpPr>
+        <p:spPr>
+          <a:xfrm>
+            <a:off x="3546764" y="5213186"/>
+            <a:ext cx="442590" cy="735031"/>
+          </a:xfrm>
+          <a:prstGeom prst="ellipse">
+            <a:avLst/>
+          </a:prstGeom>
+          <a:noFill/>
+          <a:ln w="38100">
+            <a:solidFill>
+              <a:srgbClr val="00B050"/>
+            </a:solidFill>
+          </a:ln>
+        </p:spPr>
+        <p:style>
+          <a:lnRef idx="2">
+            <a:schemeClr val="accent1">
+              <a:shade val="50000"/>
+            </a:schemeClr>
+          </a:lnRef>
+          <a:fillRef idx="1">
+            <a:schemeClr val="accent1"/>
+          </a:fillRef>
+          <a:effectRef idx="0">
+            <a:schemeClr val="accent1"/>
+          </a:effectRef>
+          <a:fontRef idx="minor">
+            <a:schemeClr val="lt1"/>
+          </a:fontRef>
+        </p:style>
+        <p:txBody>
+          <a:bodyPr rtlCol="0" anchor="ctr"/>
+          <a:lstStyle/>
+          <a:p>
+            <a:pPr algn="ctr"/>
+            <a:endParaRPr lang="tr-TR"/>
+          </a:p>
+        </p:txBody>
+      </p:sp>
+      <p:sp>
+        <p:nvSpPr>
+          <p:cNvPr id="24" name="TextBox 23"/>
+          <p:cNvSpPr txBox="1"/>
+          <p:nvPr/>
+        </p:nvSpPr>
+        <p:spPr>
+          <a:xfrm>
+            <a:off x="1903890" y="6485598"/>
+            <a:ext cx="3296183" cy="400110"/>
+          </a:xfrm>
+          <a:prstGeom prst="rect">
+            <a:avLst/>
+          </a:prstGeom>
+          <a:noFill/>
+        </p:spPr>
+        <p:txBody>
+          <a:bodyPr wrap="square" rtlCol="0">
+            <a:spAutoFit/>
+          </a:bodyPr>
+          <a:lstStyle/>
+          <a:p>
+            <a:r>
+              <a:rPr lang="tr-TR" sz="2000" b="1" dirty="0" smtClean="0">
+                <a:solidFill>
+                  <a:srgbClr val="00B050"/>
+                </a:solidFill>
+              </a:rPr>
+              <a:t>Soft Switching gets distorted</a:t>
+            </a:r>
+            <a:endParaRPr lang="tr-TR" sz="2000" b="1" dirty="0">
+              <a:solidFill>
+                <a:srgbClr val="00B050"/>
+              </a:solidFill>
+            </a:endParaRPr>
+          </a:p>
+        </p:txBody>
+      </p:sp>
+      <p:cxnSp>
+        <p:nvCxnSpPr>
+          <p:cNvPr id="29" name="Straight Arrow Connector 28"/>
+          <p:cNvCxnSpPr/>
+          <p:nvPr/>
+        </p:nvCxnSpPr>
+        <p:spPr>
+          <a:xfrm flipH="1">
+            <a:off x="8825155" y="4110182"/>
+            <a:ext cx="928445" cy="280843"/>
+          </a:xfrm>
+          <a:prstGeom prst="straightConnector1">
+            <a:avLst/>
+          </a:prstGeom>
+          <a:ln w="19050">
+            <a:solidFill>
+              <a:srgbClr val="00B050"/>
+            </a:solidFill>
+            <a:tailEnd type="triangle"/>
+          </a:ln>
+        </p:spPr>
+        <p:style>
+          <a:lnRef idx="1">
+            <a:schemeClr val="accent1"/>
+          </a:lnRef>
+          <a:fillRef idx="0">
+            <a:schemeClr val="accent1"/>
+          </a:fillRef>
+          <a:effectRef idx="0">
+            <a:schemeClr val="accent1"/>
+          </a:effectRef>
+          <a:fontRef idx="minor">
+            <a:schemeClr val="tx1"/>
+          </a:fontRef>
+        </p:style>
+      </p:cxnSp>
+    </p:spTree>
+    <p:extLst>
+      <p:ext uri="{BB962C8B-B14F-4D97-AF65-F5344CB8AC3E}">
+        <p14:creationId xmlns:p14="http://schemas.microsoft.com/office/powerpoint/2010/main" val="3146074131"/>
+      </p:ext>
+    </p:extLst>
+  </p:cSld>
+  <p:clrMapOvr>
+    <a:masterClrMapping/>
+  </p:clrMapOvr>
+  <p:timing>
+    <p:tnLst>
+      <p:par>
+        <p:cTn id="1" dur="indefinite" restart="never" nodeType="tmRoot"/>
+      </p:par>
+    </p:tnLst>
+  </p:timing>
+</p:sld>
+</file>
+
+<file path=ppt/slides/slide8.xml><?xml version="1.0" encoding="utf-8"?>
+<p:sld xmlns:a="http://schemas.openxmlformats.org/drawingml/2006/main" xmlns:r="http://schemas.openxmlformats.org/officeDocument/2006/relationships" xmlns:p="http://schemas.openxmlformats.org/presentationml/2006/main">
+  <p:cSld>
+    <p:spTree>
+      <p:nvGrpSpPr>
+        <p:cNvPr id="1" name=""/>
+        <p:cNvGrpSpPr/>
+        <p:nvPr/>
+      </p:nvGrpSpPr>
+      <p:grpSpPr>
+        <a:xfrm>
+          <a:off x="0" y="0"/>
+          <a:ext cx="0" cy="0"/>
+          <a:chOff x="0" y="0"/>
+          <a:chExt cx="0" cy="0"/>
+        </a:xfrm>
+      </p:grpSpPr>
+      <p:sp>
+        <p:nvSpPr>
+          <p:cNvPr id="4" name="Slide Number Placeholder 3"/>
+          <p:cNvSpPr>
+            <a:spLocks noGrp="1"/>
+          </p:cNvSpPr>
+          <p:nvPr>
+            <p:ph type="sldNum" sz="quarter" idx="12"/>
+          </p:nvPr>
+        </p:nvSpPr>
+        <p:spPr/>
+        <p:txBody>
+          <a:bodyPr/>
+          <a:lstStyle/>
+          <a:p>
+            <a:fld id="{178508F5-8E49-4F57-B165-331DE2AB85B8}" type="slidenum">
+              <a:rPr lang="tr-TR" sz="1800" smtClean="0"/>
+              <a:t>8</a:t>
+            </a:fld>
+            <a:endParaRPr lang="tr-TR" sz="1800" dirty="0"/>
+          </a:p>
+        </p:txBody>
+      </p:sp>
+      <p:sp>
+        <p:nvSpPr>
+          <p:cNvPr id="5" name="TextBox 4"/>
+          <p:cNvSpPr txBox="1"/>
+          <p:nvPr/>
+        </p:nvSpPr>
+        <p:spPr>
+          <a:xfrm>
+            <a:off x="465992" y="219808"/>
+            <a:ext cx="6268916" cy="523220"/>
+          </a:xfrm>
+          <a:prstGeom prst="rect">
+            <a:avLst/>
+          </a:prstGeom>
+          <a:noFill/>
+        </p:spPr>
+        <p:txBody>
+          <a:bodyPr wrap="square" rtlCol="0">
+            <a:spAutoFit/>
+          </a:bodyPr>
+          <a:lstStyle/>
+          <a:p>
+            <a:r>
+              <a:rPr lang="tr-TR" sz="2800" dirty="0" smtClean="0"/>
+              <a:t>Loss Analysis</a:t>
+            </a:r>
+            <a:endParaRPr lang="tr-TR" sz="2800" dirty="0"/>
+          </a:p>
+        </p:txBody>
+      </p:sp>
+      <p:graphicFrame>
+        <p:nvGraphicFramePr>
+          <p:cNvPr id="14" name="Table 13"/>
+          <p:cNvGraphicFramePr>
+            <a:graphicFrameLocks noGrp="1"/>
+          </p:cNvGraphicFramePr>
+          <p:nvPr>
+            <p:extLst>
+              <p:ext uri="{D42A27DB-BD31-4B8C-83A1-F6EECF244321}">
+                <p14:modId xmlns:p14="http://schemas.microsoft.com/office/powerpoint/2010/main" val="926249754"/>
+              </p:ext>
+            </p:extLst>
+          </p:nvPr>
+        </p:nvGraphicFramePr>
+        <p:xfrm>
+          <a:off x="932872" y="785890"/>
+          <a:ext cx="10068502" cy="2966720"/>
+        </p:xfrm>
+        <a:graphic>
+          <a:graphicData uri="http://schemas.openxmlformats.org/drawingml/2006/table">
+            <a:tbl>
+              <a:tblPr firstRow="1" bandRow="1">
+                <a:tableStyleId>{7DF18680-E054-41AD-8BC1-D1AEF772440D}</a:tableStyleId>
+              </a:tblPr>
+              <a:tblGrid>
+                <a:gridCol w="2408186">
+                  <a:extLst>
+                    <a:ext uri="{9D8B030D-6E8A-4147-A177-3AD203B41FA5}">
+                      <a16:colId xmlns:a16="http://schemas.microsoft.com/office/drawing/2014/main" val="3742650035"/>
+                    </a:ext>
+                  </a:extLst>
+                </a:gridCol>
+                <a:gridCol w="3830158">
+                  <a:extLst>
+                    <a:ext uri="{9D8B030D-6E8A-4147-A177-3AD203B41FA5}">
+                      <a16:colId xmlns:a16="http://schemas.microsoft.com/office/drawing/2014/main" val="1819645119"/>
+                    </a:ext>
+                  </a:extLst>
+                </a:gridCol>
+                <a:gridCol w="3830158">
+                  <a:extLst>
+                    <a:ext uri="{9D8B030D-6E8A-4147-A177-3AD203B41FA5}">
+                      <a16:colId xmlns:a16="http://schemas.microsoft.com/office/drawing/2014/main" val="3187696016"/>
+                    </a:ext>
+                  </a:extLst>
+                </a:gridCol>
+              </a:tblGrid>
+              <a:tr h="370840">
+                <a:tc>
+                  <a:txBody>
+                    <a:bodyPr/>
+                    <a:lstStyle/>
+                    <a:p>
+                      <a:endParaRPr lang="tr-TR" dirty="0"/>
+                    </a:p>
+                  </a:txBody>
+                  <a:tcPr/>
+                </a:tc>
+                <a:tc>
+                  <a:txBody>
+                    <a:bodyPr/>
+                    <a:lstStyle/>
+                    <a:p>
+                      <a:pPr algn="ctr"/>
+                      <a:r>
+                        <a:rPr lang="tr-TR" dirty="0" smtClean="0"/>
+                        <a:t>Results for 20A Output</a:t>
+                      </a:r>
+                      <a:r>
+                        <a:rPr lang="tr-TR" baseline="0" dirty="0" smtClean="0"/>
+                        <a:t> Current</a:t>
+                      </a:r>
+                      <a:endParaRPr lang="tr-TR" dirty="0"/>
+                    </a:p>
+                  </a:txBody>
+                  <a:tcPr/>
+                </a:tc>
+                <a:tc>
+                  <a:txBody>
+                    <a:bodyPr/>
+                    <a:lstStyle/>
+                    <a:p>
+                      <a:pPr algn="ctr"/>
+                      <a:r>
+                        <a:rPr lang="tr-TR" dirty="0" smtClean="0"/>
+                        <a:t>Results</a:t>
+                      </a:r>
+                      <a:r>
+                        <a:rPr lang="tr-TR" baseline="0" dirty="0" smtClean="0"/>
+                        <a:t> for 2A Output Current</a:t>
+                      </a:r>
+                      <a:endParaRPr lang="tr-TR" dirty="0"/>
+                    </a:p>
+                  </a:txBody>
+                  <a:tcPr/>
+                </a:tc>
+                <a:extLst>
+                  <a:ext uri="{0D108BD9-81ED-4DB2-BD59-A6C34878D82A}">
+                    <a16:rowId xmlns:a16="http://schemas.microsoft.com/office/drawing/2014/main" val="3787613991"/>
+                  </a:ext>
+                </a:extLst>
+              </a:tr>
+              <a:tr h="370840">
+                <a:tc>
+                  <a:txBody>
+                    <a:bodyPr/>
+                    <a:lstStyle/>
+                    <a:p>
+                      <a:pPr algn="l"/>
+                      <a:r>
+                        <a:rPr lang="tr-TR" dirty="0" smtClean="0"/>
+                        <a:t>I(C)</a:t>
+                      </a:r>
+                      <a:endParaRPr lang="tr-TR" dirty="0"/>
+                    </a:p>
+                  </a:txBody>
+                  <a:tcPr/>
+                </a:tc>
+                <a:tc>
+                  <a:txBody>
+                    <a:bodyPr/>
+                    <a:lstStyle/>
+                    <a:p>
+                      <a:pPr algn="ctr"/>
+                      <a:r>
+                        <a:rPr lang="tr-TR" dirty="0" smtClean="0"/>
+                        <a:t>5.718 Arms</a:t>
+                      </a:r>
+                      <a:r>
+                        <a:rPr lang="tr-TR" baseline="0" dirty="0" smtClean="0"/>
+                        <a:t> @1MHz</a:t>
+                      </a:r>
+                      <a:endParaRPr lang="tr-TR" dirty="0"/>
+                    </a:p>
+                  </a:txBody>
+                  <a:tcPr/>
+                </a:tc>
+                <a:tc>
+                  <a:txBody>
+                    <a:bodyPr/>
+                    <a:lstStyle/>
+                    <a:p>
+                      <a:pPr algn="ctr"/>
+                      <a:r>
+                        <a:rPr lang="tr-TR" dirty="0" smtClean="0"/>
+                        <a:t>5.718 Arms @1MHz</a:t>
+                      </a:r>
+                      <a:endParaRPr lang="tr-TR" dirty="0"/>
+                    </a:p>
+                  </a:txBody>
+                  <a:tcPr/>
+                </a:tc>
+                <a:extLst>
+                  <a:ext uri="{0D108BD9-81ED-4DB2-BD59-A6C34878D82A}">
+                    <a16:rowId xmlns:a16="http://schemas.microsoft.com/office/drawing/2014/main" val="4013694663"/>
+                  </a:ext>
+                </a:extLst>
+              </a:tr>
+              <a:tr h="370840">
+                <a:tc>
+                  <a:txBody>
+                    <a:bodyPr/>
+                    <a:lstStyle/>
+                    <a:p>
+                      <a:pPr algn="l"/>
+                      <a:r>
+                        <a:rPr lang="tr-TR" dirty="0" smtClean="0"/>
+                        <a:t>I(L)</a:t>
+                      </a:r>
+                      <a:endParaRPr lang="tr-TR" dirty="0"/>
+                    </a:p>
+                  </a:txBody>
+                  <a:tcPr/>
+                </a:tc>
+                <a:tc>
+                  <a:txBody>
+                    <a:bodyPr/>
+                    <a:lstStyle/>
+                    <a:p>
+                      <a:pPr algn="ctr"/>
+                      <a:r>
+                        <a:rPr lang="tr-TR" dirty="0" smtClean="0"/>
+                        <a:t>13.26 Arms @500</a:t>
+                      </a:r>
+                      <a:r>
+                        <a:rPr lang="tr-TR" baseline="0" dirty="0" smtClean="0"/>
+                        <a:t> kHz</a:t>
+                      </a:r>
+                      <a:endParaRPr lang="tr-TR" dirty="0"/>
+                    </a:p>
+                  </a:txBody>
+                  <a:tcPr/>
+                </a:tc>
+                <a:tc>
+                  <a:txBody>
+                    <a:bodyPr/>
+                    <a:lstStyle/>
+                    <a:p>
+                      <a:pPr algn="ctr"/>
+                      <a:r>
+                        <a:rPr lang="tr-TR" dirty="0" smtClean="0"/>
+                        <a:t>8.308 Arms @500 kHz</a:t>
+                      </a:r>
+                      <a:endParaRPr lang="tr-TR" dirty="0"/>
+                    </a:p>
+                  </a:txBody>
+                  <a:tcPr/>
+                </a:tc>
+                <a:extLst>
+                  <a:ext uri="{0D108BD9-81ED-4DB2-BD59-A6C34878D82A}">
+                    <a16:rowId xmlns:a16="http://schemas.microsoft.com/office/drawing/2014/main" val="19271735"/>
+                  </a:ext>
+                </a:extLst>
+              </a:tr>
+              <a:tr h="370840">
+                <a:tc>
+                  <a:txBody>
+                    <a:bodyPr/>
+                    <a:lstStyle/>
+                    <a:p>
+                      <a:pPr algn="l"/>
+                      <a:r>
+                        <a:rPr lang="tr-TR" dirty="0" smtClean="0"/>
+                        <a:t>Ipeak(L)</a:t>
+                      </a:r>
+                      <a:endParaRPr lang="tr-TR" dirty="0"/>
+                    </a:p>
+                  </a:txBody>
+                  <a:tcPr/>
+                </a:tc>
+                <a:tc>
+                  <a:txBody>
+                    <a:bodyPr/>
+                    <a:lstStyle/>
+                    <a:p>
+                      <a:pPr algn="ctr"/>
+                      <a:r>
+                        <a:rPr lang="tr-TR" dirty="0" smtClean="0"/>
+                        <a:t>25 A,</a:t>
+                      </a:r>
+                      <a:r>
+                        <a:rPr lang="tr-TR" baseline="0" dirty="0" smtClean="0"/>
+                        <a:t> -4.5 A</a:t>
+                      </a:r>
+                      <a:endParaRPr lang="tr-TR" dirty="0"/>
+                    </a:p>
+                  </a:txBody>
+                  <a:tcPr/>
+                </a:tc>
+                <a:tc>
+                  <a:txBody>
+                    <a:bodyPr/>
+                    <a:lstStyle/>
+                    <a:p>
+                      <a:pPr algn="ctr"/>
+                      <a:r>
+                        <a:rPr lang="tr-TR" dirty="0" smtClean="0"/>
+                        <a:t>15 A, -13A</a:t>
+                      </a:r>
+                      <a:endParaRPr lang="tr-TR" dirty="0"/>
+                    </a:p>
+                  </a:txBody>
+                  <a:tcPr/>
+                </a:tc>
+                <a:extLst>
+                  <a:ext uri="{0D108BD9-81ED-4DB2-BD59-A6C34878D82A}">
+                    <a16:rowId xmlns:a16="http://schemas.microsoft.com/office/drawing/2014/main" val="460727978"/>
+                  </a:ext>
+                </a:extLst>
+              </a:tr>
+              <a:tr h="370840">
+                <a:tc>
+                  <a:txBody>
+                    <a:bodyPr/>
+                    <a:lstStyle/>
+                    <a:p>
+                      <a:pPr algn="l"/>
+                      <a:r>
+                        <a:rPr lang="tr-TR" dirty="0" smtClean="0"/>
+                        <a:t>Ploss(top switch)</a:t>
+                      </a:r>
+                      <a:endParaRPr lang="tr-TR" dirty="0"/>
+                    </a:p>
+                  </a:txBody>
+                  <a:tcPr/>
+                </a:tc>
+                <a:tc>
+                  <a:txBody>
+                    <a:bodyPr/>
+                    <a:lstStyle/>
+                    <a:p>
+                      <a:pPr algn="ctr"/>
+                      <a:r>
+                        <a:rPr lang="tr-TR" dirty="0" smtClean="0"/>
+                        <a:t>4.6 W</a:t>
+                      </a:r>
+                      <a:endParaRPr lang="tr-TR" dirty="0"/>
+                    </a:p>
+                  </a:txBody>
+                  <a:tcPr/>
+                </a:tc>
+                <a:tc>
+                  <a:txBody>
+                    <a:bodyPr/>
+                    <a:lstStyle/>
+                    <a:p>
+                      <a:pPr algn="ctr"/>
+                      <a:r>
+                        <a:rPr lang="tr-TR" dirty="0" smtClean="0"/>
+                        <a:t>2.58 W</a:t>
+                      </a:r>
+                      <a:endParaRPr lang="tr-TR" dirty="0"/>
+                    </a:p>
+                  </a:txBody>
+                  <a:tcPr/>
+                </a:tc>
+                <a:extLst>
+                  <a:ext uri="{0D108BD9-81ED-4DB2-BD59-A6C34878D82A}">
+                    <a16:rowId xmlns:a16="http://schemas.microsoft.com/office/drawing/2014/main" val="3908604105"/>
+                  </a:ext>
+                </a:extLst>
+              </a:tr>
+              <a:tr h="370840">
+                <a:tc>
+                  <a:txBody>
+                    <a:bodyPr/>
+                    <a:lstStyle/>
+                    <a:p>
+                      <a:pPr marL="0" marR="0" indent="0" algn="l" defTabSz="914400" rtl="0" eaLnBrk="1" fontAlgn="auto" latinLnBrk="0" hangingPunct="1">
+                        <a:lnSpc>
+                          <a:spcPct val="100000"/>
+                        </a:lnSpc>
+                        <a:spcBef>
+                          <a:spcPts val="0"/>
+                        </a:spcBef>
+                        <a:spcAft>
+                          <a:spcPts val="0"/>
+                        </a:spcAft>
+                        <a:buClrTx/>
+                        <a:buSzTx/>
+                        <a:buFontTx/>
+                        <a:buNone/>
+                        <a:tabLst/>
+                        <a:defRPr/>
+                      </a:pPr>
+                      <a:r>
+                        <a:rPr lang="tr-TR" dirty="0" smtClean="0"/>
+                        <a:t>Ploss(bot switch)</a:t>
+                      </a:r>
+                    </a:p>
+                  </a:txBody>
+                  <a:tcPr/>
+                </a:tc>
+                <a:tc>
+                  <a:txBody>
+                    <a:bodyPr/>
+                    <a:lstStyle/>
+                    <a:p>
+                      <a:pPr algn="ctr"/>
+                      <a:r>
+                        <a:rPr lang="tr-TR" dirty="0" smtClean="0"/>
+                        <a:t>3.76 W</a:t>
+                      </a:r>
+                      <a:endParaRPr lang="tr-TR" dirty="0"/>
+                    </a:p>
+                  </a:txBody>
+                  <a:tcPr/>
+                </a:tc>
+                <a:tc>
+                  <a:txBody>
+                    <a:bodyPr/>
+                    <a:lstStyle/>
+                    <a:p>
+                      <a:pPr algn="ctr"/>
+                      <a:r>
+                        <a:rPr lang="tr-TR" dirty="0" smtClean="0"/>
+                        <a:t>1.44 W</a:t>
+                      </a:r>
+                      <a:endParaRPr lang="tr-TR" dirty="0"/>
+                    </a:p>
+                  </a:txBody>
+                  <a:tcPr/>
+                </a:tc>
+                <a:extLst>
+                  <a:ext uri="{0D108BD9-81ED-4DB2-BD59-A6C34878D82A}">
+                    <a16:rowId xmlns:a16="http://schemas.microsoft.com/office/drawing/2014/main" val="2278721399"/>
+                  </a:ext>
+                </a:extLst>
+              </a:tr>
+              <a:tr h="370840">
+                <a:tc>
+                  <a:txBody>
+                    <a:bodyPr/>
+                    <a:lstStyle/>
+                    <a:p>
+                      <a:pPr marL="0" marR="0" indent="0" algn="l" defTabSz="914400" rtl="0" eaLnBrk="1" fontAlgn="auto" latinLnBrk="0" hangingPunct="1">
+                        <a:lnSpc>
+                          <a:spcPct val="100000"/>
+                        </a:lnSpc>
+                        <a:spcBef>
+                          <a:spcPts val="0"/>
+                        </a:spcBef>
+                        <a:spcAft>
+                          <a:spcPts val="0"/>
+                        </a:spcAft>
+                        <a:buClrTx/>
+                        <a:buSzTx/>
+                        <a:buFontTx/>
+                        <a:buNone/>
+                        <a:tabLst/>
+                        <a:defRPr/>
+                      </a:pPr>
+                      <a:r>
+                        <a:rPr lang="tr-TR" dirty="0" smtClean="0"/>
+                        <a:t>Ploss(total)</a:t>
+                      </a:r>
+                    </a:p>
+                  </a:txBody>
+                  <a:tcPr/>
+                </a:tc>
+                <a:tc>
+                  <a:txBody>
+                    <a:bodyPr/>
+                    <a:lstStyle/>
+                    <a:p>
+                      <a:pPr algn="ctr"/>
+                      <a:r>
+                        <a:rPr lang="tr-TR" dirty="0" smtClean="0"/>
+                        <a:t>33.4</a:t>
+                      </a:r>
+                      <a:r>
+                        <a:rPr lang="tr-TR" baseline="0" dirty="0" smtClean="0"/>
+                        <a:t> W</a:t>
+                      </a:r>
+                      <a:endParaRPr lang="tr-TR" dirty="0"/>
+                    </a:p>
+                  </a:txBody>
+                  <a:tcPr/>
+                </a:tc>
+                <a:tc>
+                  <a:txBody>
+                    <a:bodyPr/>
+                    <a:lstStyle/>
+                    <a:p>
+                      <a:pPr algn="ctr"/>
+                      <a:r>
+                        <a:rPr lang="tr-TR" dirty="0" smtClean="0"/>
+                        <a:t>16.08 W</a:t>
+                      </a:r>
+                      <a:endParaRPr lang="tr-TR" dirty="0"/>
+                    </a:p>
+                  </a:txBody>
+                  <a:tcPr/>
+                </a:tc>
+                <a:extLst>
+                  <a:ext uri="{0D108BD9-81ED-4DB2-BD59-A6C34878D82A}">
+                    <a16:rowId xmlns:a16="http://schemas.microsoft.com/office/drawing/2014/main" val="1839603384"/>
+                  </a:ext>
+                </a:extLst>
+              </a:tr>
+              <a:tr h="370840">
+                <a:tc>
+                  <a:txBody>
+                    <a:bodyPr/>
+                    <a:lstStyle/>
+                    <a:p>
+                      <a:pPr marL="0" marR="0" indent="0" algn="l" defTabSz="914400" rtl="0" eaLnBrk="1" fontAlgn="auto" latinLnBrk="0" hangingPunct="1">
+                        <a:lnSpc>
+                          <a:spcPct val="100000"/>
+                        </a:lnSpc>
+                        <a:spcBef>
+                          <a:spcPts val="0"/>
+                        </a:spcBef>
+                        <a:spcAft>
+                          <a:spcPts val="0"/>
+                        </a:spcAft>
+                        <a:buClrTx/>
+                        <a:buSzTx/>
+                        <a:buFontTx/>
+                        <a:buNone/>
+                        <a:tabLst/>
+                        <a:defRPr/>
+                      </a:pPr>
+                      <a:r>
+                        <a:rPr lang="tr-TR" dirty="0" smtClean="0"/>
+                        <a:t>K</a:t>
+                      </a:r>
+                    </a:p>
+                  </a:txBody>
+                  <a:tcPr/>
+                </a:tc>
+                <a:tc>
+                  <a:txBody>
+                    <a:bodyPr/>
+                    <a:lstStyle/>
+                    <a:p>
+                      <a:pPr algn="ctr"/>
+                      <a:r>
+                        <a:rPr lang="tr-TR" dirty="0" smtClean="0"/>
+                        <a:t>3</a:t>
+                      </a:r>
+                      <a:endParaRPr lang="tr-TR" dirty="0"/>
+                    </a:p>
+                  </a:txBody>
+                  <a:tcPr/>
+                </a:tc>
+                <a:tc>
+                  <a:txBody>
+                    <a:bodyPr/>
+                    <a:lstStyle/>
+                    <a:p>
+                      <a:pPr algn="ctr"/>
+                      <a:r>
+                        <a:rPr lang="tr-TR" dirty="0" smtClean="0"/>
+                        <a:t>30</a:t>
+                      </a:r>
+                      <a:endParaRPr lang="tr-TR" dirty="0"/>
+                    </a:p>
+                  </a:txBody>
+                  <a:tcPr/>
+                </a:tc>
+                <a:extLst>
+                  <a:ext uri="{0D108BD9-81ED-4DB2-BD59-A6C34878D82A}">
+                    <a16:rowId xmlns:a16="http://schemas.microsoft.com/office/drawing/2014/main" val="2909882164"/>
+                  </a:ext>
+                </a:extLst>
+              </a:tr>
+            </a:tbl>
+          </a:graphicData>
+        </a:graphic>
+      </p:graphicFrame>
+      <p:sp>
+        <p:nvSpPr>
+          <p:cNvPr id="2" name="TextBox 1"/>
+          <p:cNvSpPr txBox="1"/>
+          <p:nvPr/>
+        </p:nvSpPr>
+        <p:spPr>
+          <a:xfrm>
+            <a:off x="1076325" y="4095750"/>
+            <a:ext cx="5981700" cy="1200329"/>
+          </a:xfrm>
+          <a:prstGeom prst="rect">
+            <a:avLst/>
+          </a:prstGeom>
+          <a:noFill/>
+        </p:spPr>
+        <p:txBody>
+          <a:bodyPr wrap="square" rtlCol="0">
+            <a:spAutoFit/>
+          </a:bodyPr>
+          <a:lstStyle/>
+          <a:p>
+            <a:pPr marL="285750" indent="-285750">
+              <a:buFont typeface="Arial" panose="020B0604020202020204" pitchFamily="34" charset="0"/>
+              <a:buChar char="•"/>
+            </a:pPr>
+            <a:r>
+              <a:rPr lang="tr-TR" dirty="0" smtClean="0"/>
+              <a:t>Soft-switching is still maintained</a:t>
+            </a:r>
+          </a:p>
+          <a:p>
+            <a:pPr marL="285750" indent="-285750">
+              <a:buFont typeface="Arial" panose="020B0604020202020204" pitchFamily="34" charset="0"/>
+              <a:buChar char="•"/>
+            </a:pPr>
+            <a:r>
+              <a:rPr lang="tr-TR" dirty="0" smtClean="0"/>
+              <a:t>The ripple current still has the same peak-to-peak levels</a:t>
+            </a:r>
+          </a:p>
+          <a:p>
+            <a:pPr marL="285750" indent="-285750">
+              <a:buFont typeface="Arial" panose="020B0604020202020204" pitchFamily="34" charset="0"/>
+              <a:buChar char="•"/>
+            </a:pPr>
+            <a:r>
+              <a:rPr lang="tr-TR" dirty="0" smtClean="0"/>
+              <a:t>Inductor &amp; capacitor losses are similar</a:t>
+            </a:r>
+          </a:p>
+          <a:p>
+            <a:pPr marL="285750" indent="-285750">
+              <a:buFont typeface="Arial" panose="020B0604020202020204" pitchFamily="34" charset="0"/>
+              <a:buChar char="•"/>
+            </a:pPr>
+            <a:r>
+              <a:rPr lang="tr-TR" dirty="0" smtClean="0"/>
+              <a:t>Unefficient power transition for low output current</a:t>
+            </a:r>
+            <a:endParaRPr lang="tr-TR" dirty="0"/>
+          </a:p>
+        </p:txBody>
+      </p:sp>
+      <mc:AlternateContent xmlns:mc="http://schemas.openxmlformats.org/markup-compatibility/2006" xmlns:a14="http://schemas.microsoft.com/office/drawing/2010/main">
+        <mc:Choice Requires="a14">
+          <p:sp>
+            <p:nvSpPr>
+              <p:cNvPr id="3" name="TextBox 2"/>
+              <p:cNvSpPr txBox="1"/>
+              <p:nvPr/>
+            </p:nvSpPr>
+            <p:spPr>
+              <a:xfrm>
+                <a:off x="7251247" y="4384739"/>
+                <a:ext cx="3347327" cy="622350"/>
+              </a:xfrm>
+              <a:prstGeom prst="rect">
+                <a:avLst/>
+              </a:prstGeom>
+              <a:noFill/>
+            </p:spPr>
+            <p:txBody>
+              <a:bodyPr wrap="none" lIns="0" tIns="0" rIns="0" bIns="0" rtlCol="0">
+                <a:spAutoFit/>
+              </a:bodyPr>
+              <a:lstStyle/>
+              <a:p>
+                <a:pPr/>
+                <a14:m>
+                  <m:oMathPara xmlns:m="http://schemas.openxmlformats.org/officeDocument/2006/math">
+                    <m:oMathParaPr>
+                      <m:jc m:val="centerGroup"/>
+                    </m:oMathParaPr>
+                    <m:oMath xmlns:m="http://schemas.openxmlformats.org/officeDocument/2006/math">
+                      <m:r>
+                        <a:rPr lang="tr-TR" b="0" i="1" smtClean="0">
+                          <a:latin typeface="Cambria Math" panose="02040503050406030204" pitchFamily="18" charset="0"/>
+                        </a:rPr>
+                        <m:t>𝐾</m:t>
+                      </m:r>
+                      <m:r>
+                        <a:rPr lang="tr-TR" b="0" i="1" smtClean="0">
+                          <a:latin typeface="Cambria Math" panose="02040503050406030204" pitchFamily="18" charset="0"/>
+                        </a:rPr>
+                        <m:t>=</m:t>
+                      </m:r>
+                      <m:f>
+                        <m:fPr>
+                          <m:ctrlPr>
+                            <a:rPr lang="tr-TR" b="0" i="1" smtClean="0">
+                              <a:latin typeface="Cambria Math" panose="02040503050406030204" pitchFamily="18" charset="0"/>
+                            </a:rPr>
+                          </m:ctrlPr>
+                        </m:fPr>
+                        <m:num>
+                          <m:r>
+                            <a:rPr lang="tr-TR" b="0" i="1" smtClean="0">
+                              <a:latin typeface="Cambria Math" panose="02040503050406030204" pitchFamily="18" charset="0"/>
+                            </a:rPr>
+                            <m:t>1</m:t>
+                          </m:r>
+                        </m:num>
+                        <m:den>
+                          <m:r>
+                            <a:rPr lang="tr-TR" b="0" i="1" smtClean="0">
+                              <a:latin typeface="Cambria Math" panose="02040503050406030204" pitchFamily="18" charset="0"/>
+                            </a:rPr>
+                            <m:t>𝐿</m:t>
+                          </m:r>
+                        </m:den>
+                      </m:f>
+                      <m:r>
+                        <a:rPr lang="tr-TR" b="0" i="1" smtClean="0">
+                          <a:latin typeface="Cambria Math" panose="02040503050406030204" pitchFamily="18" charset="0"/>
+                        </a:rPr>
+                        <m:t>∗</m:t>
+                      </m:r>
+                      <m:d>
+                        <m:dPr>
+                          <m:ctrlPr>
+                            <a:rPr lang="tr-TR" b="0" i="1" smtClean="0">
+                              <a:latin typeface="Cambria Math" panose="02040503050406030204" pitchFamily="18" charset="0"/>
+                            </a:rPr>
+                          </m:ctrlPr>
+                        </m:dPr>
+                        <m:e>
+                          <m:r>
+                            <a:rPr lang="tr-TR" b="0" i="1" smtClean="0">
+                              <a:latin typeface="Cambria Math" panose="02040503050406030204" pitchFamily="18" charset="0"/>
+                            </a:rPr>
+                            <m:t>1−</m:t>
+                          </m:r>
+                          <m:f>
+                            <m:fPr>
+                              <m:ctrlPr>
+                                <a:rPr lang="tr-TR" b="0" i="1" smtClean="0">
+                                  <a:latin typeface="Cambria Math" panose="02040503050406030204" pitchFamily="18" charset="0"/>
+                                </a:rPr>
+                              </m:ctrlPr>
+                            </m:fPr>
+                            <m:num>
+                              <m:sSub>
+                                <m:sSubPr>
+                                  <m:ctrlPr>
+                                    <a:rPr lang="tr-TR" b="0" i="1" smtClean="0">
+                                      <a:latin typeface="Cambria Math" panose="02040503050406030204" pitchFamily="18" charset="0"/>
+                                    </a:rPr>
+                                  </m:ctrlPr>
+                                </m:sSubPr>
+                                <m:e>
+                                  <m:r>
+                                    <a:rPr lang="tr-TR" b="0" i="1" smtClean="0">
+                                      <a:latin typeface="Cambria Math" panose="02040503050406030204" pitchFamily="18" charset="0"/>
+                                    </a:rPr>
+                                    <m:t>𝑉</m:t>
+                                  </m:r>
+                                </m:e>
+                                <m:sub>
+                                  <m:r>
+                                    <a:rPr lang="tr-TR" b="0" i="1" smtClean="0">
+                                      <a:latin typeface="Cambria Math" panose="02040503050406030204" pitchFamily="18" charset="0"/>
+                                    </a:rPr>
+                                    <m:t>𝑜𝑢𝑡</m:t>
+                                  </m:r>
+                                </m:sub>
+                              </m:sSub>
+                            </m:num>
+                            <m:den>
+                              <m:sSub>
+                                <m:sSubPr>
+                                  <m:ctrlPr>
+                                    <a:rPr lang="tr-TR" b="0" i="1" smtClean="0">
+                                      <a:latin typeface="Cambria Math" panose="02040503050406030204" pitchFamily="18" charset="0"/>
+                                    </a:rPr>
+                                  </m:ctrlPr>
+                                </m:sSubPr>
+                                <m:e>
+                                  <m:r>
+                                    <a:rPr lang="tr-TR" b="0" i="1" smtClean="0">
+                                      <a:latin typeface="Cambria Math" panose="02040503050406030204" pitchFamily="18" charset="0"/>
+                                    </a:rPr>
+                                    <m:t>𝑉</m:t>
+                                  </m:r>
+                                </m:e>
+                                <m:sub>
+                                  <m:r>
+                                    <a:rPr lang="tr-TR" b="0" i="1" smtClean="0">
+                                      <a:latin typeface="Cambria Math" panose="02040503050406030204" pitchFamily="18" charset="0"/>
+                                    </a:rPr>
+                                    <m:t>𝑖𝑛</m:t>
+                                  </m:r>
+                                  <m:r>
+                                    <a:rPr lang="tr-TR" b="0" i="1" smtClean="0">
+                                      <a:latin typeface="Cambria Math" panose="02040503050406030204" pitchFamily="18" charset="0"/>
+                                    </a:rPr>
+                                    <m:t>,</m:t>
+                                  </m:r>
+                                  <m:r>
+                                    <a:rPr lang="tr-TR" b="0" i="1" smtClean="0">
+                                      <a:latin typeface="Cambria Math" panose="02040503050406030204" pitchFamily="18" charset="0"/>
+                                    </a:rPr>
+                                    <m:t>𝑚𝑖𝑛</m:t>
+                                  </m:r>
+                                </m:sub>
+                              </m:sSub>
+                            </m:den>
+                          </m:f>
+                        </m:e>
+                      </m:d>
+                      <m:r>
+                        <a:rPr lang="tr-TR" b="0" i="1" smtClean="0">
+                          <a:latin typeface="Cambria Math" panose="02040503050406030204" pitchFamily="18" charset="0"/>
+                        </a:rPr>
+                        <m:t>∗</m:t>
+                      </m:r>
+                      <m:f>
+                        <m:fPr>
+                          <m:ctrlPr>
+                            <a:rPr lang="tr-TR" b="0" i="1" smtClean="0">
+                              <a:latin typeface="Cambria Math" panose="02040503050406030204" pitchFamily="18" charset="0"/>
+                            </a:rPr>
+                          </m:ctrlPr>
+                        </m:fPr>
+                        <m:num>
+                          <m:sSub>
+                            <m:sSubPr>
+                              <m:ctrlPr>
+                                <a:rPr lang="tr-TR" b="0" i="1" smtClean="0">
+                                  <a:latin typeface="Cambria Math" panose="02040503050406030204" pitchFamily="18" charset="0"/>
+                                </a:rPr>
+                              </m:ctrlPr>
+                            </m:sSubPr>
+                            <m:e>
+                              <m:r>
+                                <a:rPr lang="tr-TR" b="0" i="1" smtClean="0">
+                                  <a:latin typeface="Cambria Math" panose="02040503050406030204" pitchFamily="18" charset="0"/>
+                                </a:rPr>
+                                <m:t>𝑉</m:t>
+                              </m:r>
+                            </m:e>
+                            <m:sub>
+                              <m:r>
+                                <a:rPr lang="tr-TR" b="0" i="1" smtClean="0">
+                                  <a:latin typeface="Cambria Math" panose="02040503050406030204" pitchFamily="18" charset="0"/>
+                                </a:rPr>
+                                <m:t>𝑜𝑢𝑡</m:t>
+                              </m:r>
+                            </m:sub>
+                          </m:sSub>
+                        </m:num>
+                        <m:den>
+                          <m:sSub>
+                            <m:sSubPr>
+                              <m:ctrlPr>
+                                <a:rPr lang="tr-TR" b="0" i="1" smtClean="0">
+                                  <a:latin typeface="Cambria Math" panose="02040503050406030204" pitchFamily="18" charset="0"/>
+                                </a:rPr>
+                              </m:ctrlPr>
+                            </m:sSubPr>
+                            <m:e>
+                              <m:r>
+                                <a:rPr lang="tr-TR" b="0" i="1" smtClean="0">
+                                  <a:latin typeface="Cambria Math" panose="02040503050406030204" pitchFamily="18" charset="0"/>
+                                </a:rPr>
+                                <m:t>𝐼</m:t>
+                              </m:r>
+                            </m:e>
+                            <m:sub>
+                              <m:r>
+                                <a:rPr lang="tr-TR" b="0" i="1" smtClean="0">
+                                  <a:latin typeface="Cambria Math" panose="02040503050406030204" pitchFamily="18" charset="0"/>
+                                </a:rPr>
+                                <m:t>𝑜𝑢𝑡</m:t>
+                              </m:r>
+                            </m:sub>
+                          </m:sSub>
+                        </m:den>
+                      </m:f>
+                      <m:r>
+                        <a:rPr lang="tr-TR" b="0" i="1" smtClean="0">
+                          <a:latin typeface="Cambria Math" panose="02040503050406030204" pitchFamily="18" charset="0"/>
+                        </a:rPr>
+                        <m:t>∗</m:t>
+                      </m:r>
+                      <m:f>
+                        <m:fPr>
+                          <m:ctrlPr>
+                            <a:rPr lang="tr-TR" b="0" i="1" smtClean="0">
+                              <a:latin typeface="Cambria Math" panose="02040503050406030204" pitchFamily="18" charset="0"/>
+                            </a:rPr>
+                          </m:ctrlPr>
+                        </m:fPr>
+                        <m:num>
+                          <m:r>
+                            <a:rPr lang="tr-TR" b="0" i="1" smtClean="0">
+                              <a:latin typeface="Cambria Math" panose="02040503050406030204" pitchFamily="18" charset="0"/>
+                            </a:rPr>
+                            <m:t>1</m:t>
+                          </m:r>
+                        </m:num>
+                        <m:den>
+                          <m:sSub>
+                            <m:sSubPr>
+                              <m:ctrlPr>
+                                <a:rPr lang="tr-TR" b="0" i="1" smtClean="0">
+                                  <a:latin typeface="Cambria Math" panose="02040503050406030204" pitchFamily="18" charset="0"/>
+                                </a:rPr>
+                              </m:ctrlPr>
+                            </m:sSubPr>
+                            <m:e>
+                              <m:r>
+                                <a:rPr lang="tr-TR" b="0" i="1" smtClean="0">
+                                  <a:latin typeface="Cambria Math" panose="02040503050406030204" pitchFamily="18" charset="0"/>
+                                </a:rPr>
+                                <m:t>𝑓</m:t>
+                              </m:r>
+                            </m:e>
+                            <m:sub>
+                              <m:r>
+                                <a:rPr lang="tr-TR" b="0" i="1" smtClean="0">
+                                  <a:latin typeface="Cambria Math" panose="02040503050406030204" pitchFamily="18" charset="0"/>
+                                </a:rPr>
+                                <m:t>𝑠𝑤</m:t>
+                              </m:r>
+                            </m:sub>
+                          </m:sSub>
+                        </m:den>
+                      </m:f>
+                    </m:oMath>
+                  </m:oMathPara>
+                </a14:m>
+                <a:endParaRPr lang="tr-TR" dirty="0"/>
+              </a:p>
+            </p:txBody>
+          </p:sp>
+        </mc:Choice>
+        <mc:Fallback xmlns="">
+          <p:sp>
+            <p:nvSpPr>
+              <p:cNvPr id="3" name="TextBox 2"/>
+              <p:cNvSpPr txBox="1">
+                <a:spLocks noRot="1" noChangeAspect="1" noMove="1" noResize="1" noEditPoints="1" noAdjustHandles="1" noChangeArrowheads="1" noChangeShapeType="1" noTextEdit="1"/>
+              </p:cNvSpPr>
+              <p:nvPr/>
+            </p:nvSpPr>
+            <p:spPr>
+              <a:xfrm>
+                <a:off x="7251247" y="4384739"/>
+                <a:ext cx="3347327" cy="622350"/>
+              </a:xfrm>
+              <a:prstGeom prst="rect">
+                <a:avLst/>
+              </a:prstGeom>
+              <a:blipFill>
+                <a:blip r:embed="rId2"/>
+                <a:stretch>
+                  <a:fillRect/>
+                </a:stretch>
+              </a:blipFill>
+            </p:spPr>
+            <p:txBody>
+              <a:bodyPr/>
+              <a:lstStyle/>
+              <a:p>
+                <a:r>
+                  <a:rPr lang="tr-TR">
+                    <a:noFill/>
+                  </a:rPr>
+                  <a:t> </a:t>
+                </a:r>
+              </a:p>
+            </p:txBody>
+          </p:sp>
+        </mc:Fallback>
+      </mc:AlternateContent>
+    </p:spTree>
+    <p:extLst>
+      <p:ext uri="{BB962C8B-B14F-4D97-AF65-F5344CB8AC3E}">
+        <p14:creationId xmlns:p14="http://schemas.microsoft.com/office/powerpoint/2010/main" val="1220680741"/>
+      </p:ext>
+    </p:extLst>
+  </p:cSld>
+  <p:clrMapOvr>
+    <a:masterClrMapping/>
+  </p:clrMapOvr>
+  <p:timing>
+    <p:tnLst>
+      <p:par>
+        <p:cTn id="1" dur="indefinite" restart="never" nodeType="tmRoot"/>
+      </p:par>
+    </p:tnLst>
+  </p:timing>
+</p:sld>
+</file>
+
+<file path=ppt/slides/slide9.xml><?xml version="1.0" encoding="utf-8"?>
+<p:sld xmlns:a="http://schemas.openxmlformats.org/drawingml/2006/main" xmlns:r="http://schemas.openxmlformats.org/officeDocument/2006/relationships" xmlns:p="http://schemas.openxmlformats.org/presentationml/2006/main">
+  <p:cSld>
+    <p:spTree>
+      <p:nvGrpSpPr>
+        <p:cNvPr id="1" name=""/>
+        <p:cNvGrpSpPr/>
+        <p:nvPr/>
+      </p:nvGrpSpPr>
+      <p:grpSpPr>
+        <a:xfrm>
+          <a:off x="0" y="0"/>
+          <a:ext cx="0" cy="0"/>
+          <a:chOff x="0" y="0"/>
+          <a:chExt cx="0" cy="0"/>
+        </a:xfrm>
+      </p:grpSpPr>
+      <p:pic>
+        <p:nvPicPr>
+          <p:cNvPr id="10" name="Picture 9"/>
+          <p:cNvPicPr>
+            <a:picLocks noChangeAspect="1"/>
+          </p:cNvPicPr>
+          <p:nvPr/>
+        </p:nvPicPr>
+        <p:blipFill>
+          <a:blip r:embed="rId2"/>
+          <a:stretch>
+            <a:fillRect/>
+          </a:stretch>
+        </p:blipFill>
+        <p:spPr>
+          <a:xfrm>
+            <a:off x="7191955" y="3783921"/>
+            <a:ext cx="4366123" cy="2937554"/>
+          </a:xfrm>
+          <a:prstGeom prst="rect">
+            <a:avLst/>
+          </a:prstGeom>
+        </p:spPr>
+      </p:pic>
+      <p:sp>
+        <p:nvSpPr>
+          <p:cNvPr id="4" name="Slide Number Placeholder 3"/>
+          <p:cNvSpPr>
+            <a:spLocks noGrp="1"/>
+          </p:cNvSpPr>
+          <p:nvPr>
+            <p:ph type="sldNum" sz="quarter" idx="12"/>
+          </p:nvPr>
+        </p:nvSpPr>
+        <p:spPr/>
+        <p:txBody>
+          <a:bodyPr/>
+          <a:lstStyle/>
+          <a:p>
+            <a:fld id="{178508F5-8E49-4F57-B165-331DE2AB85B8}" type="slidenum">
+              <a:rPr lang="tr-TR" sz="1800" smtClean="0"/>
+              <a:t>9</a:t>
+            </a:fld>
+            <a:endParaRPr lang="tr-TR" sz="1800" dirty="0"/>
+          </a:p>
+        </p:txBody>
+      </p:sp>
+      <p:sp>
+        <p:nvSpPr>
+          <p:cNvPr id="5" name="TextBox 4"/>
+          <p:cNvSpPr txBox="1"/>
+          <p:nvPr/>
+        </p:nvSpPr>
+        <p:spPr>
+          <a:xfrm>
+            <a:off x="465992" y="219808"/>
+            <a:ext cx="6268916" cy="523220"/>
+          </a:xfrm>
+          <a:prstGeom prst="rect">
+            <a:avLst/>
+          </a:prstGeom>
+          <a:noFill/>
+        </p:spPr>
+        <p:txBody>
+          <a:bodyPr wrap="square" rtlCol="0">
+            <a:spAutoFit/>
+          </a:bodyPr>
+          <a:lstStyle/>
+          <a:p>
+            <a:r>
+              <a:rPr lang="tr-TR" sz="2800" dirty="0" smtClean="0"/>
+              <a:t>Capacitor Selection</a:t>
+            </a:r>
+            <a:endParaRPr lang="tr-TR" sz="2800" dirty="0"/>
+          </a:p>
+        </p:txBody>
+      </p:sp>
+      <p:sp>
+        <p:nvSpPr>
+          <p:cNvPr id="2" name="TextBox 1"/>
+          <p:cNvSpPr txBox="1"/>
+          <p:nvPr/>
+        </p:nvSpPr>
+        <p:spPr>
+          <a:xfrm>
+            <a:off x="753208" y="1238250"/>
+            <a:ext cx="5981700" cy="1754326"/>
+          </a:xfrm>
+          <a:prstGeom prst="rect">
+            <a:avLst/>
+          </a:prstGeom>
+          <a:noFill/>
+        </p:spPr>
+        <p:txBody>
+          <a:bodyPr wrap="square" rtlCol="0">
+            <a:spAutoFit/>
+          </a:bodyPr>
+          <a:lstStyle/>
+          <a:p>
+            <a:pPr marL="285750" indent="-285750">
+              <a:buFont typeface="Arial" panose="020B0604020202020204" pitchFamily="34" charset="0"/>
+              <a:buChar char="•"/>
+            </a:pPr>
+            <a:r>
+              <a:rPr lang="tr-TR" dirty="0" smtClean="0"/>
+              <a:t>The capacitor selected for 200 kHz ripple frequency cannot be used at 1 MHz because it turns into an inductor.</a:t>
+            </a:r>
+          </a:p>
+          <a:p>
+            <a:pPr marL="285750" indent="-285750">
+              <a:buFont typeface="Arial" panose="020B0604020202020204" pitchFamily="34" charset="0"/>
+              <a:buChar char="•"/>
+            </a:pPr>
+            <a:r>
+              <a:rPr lang="tr-TR" dirty="0" smtClean="0"/>
+              <a:t>Almost all of the bulky film capacitors are not able to support 1 MHz frequency ripple.</a:t>
+            </a:r>
+          </a:p>
+          <a:p>
+            <a:pPr marL="285750" indent="-285750">
+              <a:buFont typeface="Arial" panose="020B0604020202020204" pitchFamily="34" charset="0"/>
+              <a:buChar char="•"/>
+            </a:pPr>
+            <a:r>
+              <a:rPr lang="tr-TR" dirty="0" smtClean="0"/>
+              <a:t>Chip film capacitor needs to be used to filter output current.</a:t>
+            </a:r>
+            <a:endParaRPr lang="tr-TR" dirty="0"/>
+          </a:p>
+        </p:txBody>
+      </p:sp>
+      <p:pic>
+        <p:nvPicPr>
+          <p:cNvPr id="7" name="Picture 6"/>
+          <p:cNvPicPr>
+            <a:picLocks noChangeAspect="1"/>
+          </p:cNvPicPr>
+          <p:nvPr/>
+        </p:nvPicPr>
+        <p:blipFill>
+          <a:blip r:embed="rId3"/>
+          <a:stretch>
+            <a:fillRect/>
+          </a:stretch>
+        </p:blipFill>
+        <p:spPr>
+          <a:xfrm>
+            <a:off x="7043519" y="305132"/>
+            <a:ext cx="2482946" cy="1998575"/>
+          </a:xfrm>
+          <a:prstGeom prst="rect">
+            <a:avLst/>
+          </a:prstGeom>
+        </p:spPr>
+      </p:pic>
+      <p:pic>
+        <p:nvPicPr>
+          <p:cNvPr id="6" name="Picture 5"/>
+          <p:cNvPicPr>
+            <a:picLocks noChangeAspect="1"/>
+          </p:cNvPicPr>
+          <p:nvPr/>
+        </p:nvPicPr>
+        <p:blipFill>
+          <a:blip r:embed="rId4"/>
+          <a:stretch>
+            <a:fillRect/>
+          </a:stretch>
+        </p:blipFill>
+        <p:spPr>
+          <a:xfrm>
+            <a:off x="10021430" y="1979679"/>
+            <a:ext cx="646321" cy="514350"/>
+          </a:xfrm>
+          <a:prstGeom prst="rect">
+            <a:avLst/>
+          </a:prstGeom>
+        </p:spPr>
+      </p:pic>
+      <p:sp>
+        <p:nvSpPr>
+          <p:cNvPr id="8" name="TextBox 7"/>
+          <p:cNvSpPr txBox="1"/>
+          <p:nvPr/>
+        </p:nvSpPr>
+        <p:spPr>
+          <a:xfrm>
+            <a:off x="8814289" y="2494029"/>
+            <a:ext cx="3162300" cy="646331"/>
+          </a:xfrm>
+          <a:prstGeom prst="rect">
+            <a:avLst/>
+          </a:prstGeom>
+          <a:noFill/>
+        </p:spPr>
+        <p:txBody>
+          <a:bodyPr wrap="square" rtlCol="0">
+            <a:spAutoFit/>
+          </a:bodyPr>
+          <a:lstStyle/>
+          <a:p>
+            <a:pPr algn="ctr"/>
+            <a:r>
+              <a:rPr lang="tr-TR" dirty="0" smtClean="0"/>
+              <a:t>6054 Package SMD component</a:t>
+            </a:r>
+          </a:p>
+          <a:p>
+            <a:pPr algn="ctr"/>
+            <a:r>
+              <a:rPr lang="tr-TR" dirty="0" smtClean="0"/>
+              <a:t>(</a:t>
+            </a:r>
+            <a:r>
+              <a:rPr lang="tr-TR" dirty="0" smtClean="0">
+                <a:hlinkClick r:id="rId5"/>
+              </a:rPr>
+              <a:t>LDEPH3220KA5N00</a:t>
+            </a:r>
+            <a:r>
+              <a:rPr lang="tr-TR" dirty="0" smtClean="0"/>
+              <a:t>)</a:t>
+            </a:r>
+            <a:endParaRPr lang="tr-TR" dirty="0"/>
+          </a:p>
+        </p:txBody>
+      </p:sp>
+      <p:grpSp>
+        <p:nvGrpSpPr>
+          <p:cNvPr id="13" name="Group 12"/>
+          <p:cNvGrpSpPr/>
+          <p:nvPr/>
+        </p:nvGrpSpPr>
+        <p:grpSpPr>
+          <a:xfrm>
+            <a:off x="753207" y="3783922"/>
+            <a:ext cx="4249615" cy="2937554"/>
+            <a:chOff x="590550" y="3366516"/>
+            <a:chExt cx="4524375" cy="2989834"/>
+          </a:xfrm>
+        </p:grpSpPr>
+        <p:pic>
+          <p:nvPicPr>
+            <p:cNvPr id="9" name="Picture 8"/>
+            <p:cNvPicPr>
+              <a:picLocks noChangeAspect="1"/>
+            </p:cNvPicPr>
+            <p:nvPr/>
+          </p:nvPicPr>
+          <p:blipFill>
+            <a:blip r:embed="rId6"/>
+            <a:stretch>
+              <a:fillRect/>
+            </a:stretch>
+          </p:blipFill>
+          <p:spPr>
+            <a:xfrm>
+              <a:off x="590550" y="3366516"/>
+              <a:ext cx="4524375" cy="2989834"/>
+            </a:xfrm>
+            <a:prstGeom prst="rect">
+              <a:avLst/>
+            </a:prstGeom>
+          </p:spPr>
+        </p:pic>
+        <p:sp>
+          <p:nvSpPr>
+            <p:cNvPr id="11" name="5-Point Star 10"/>
+            <p:cNvSpPr/>
+            <p:nvPr/>
+          </p:nvSpPr>
+          <p:spPr>
+            <a:xfrm flipV="1">
+              <a:off x="4654955" y="3921353"/>
+              <a:ext cx="220980" cy="195023"/>
+            </a:xfrm>
+            <a:prstGeom prst="star5">
+              <a:avLst/>
+            </a:prstGeom>
+            <a:solidFill>
+              <a:srgbClr val="FF0000"/>
+            </a:solidFill>
+            <a:ln>
+              <a:solidFill>
+                <a:srgbClr val="FF0000"/>
+              </a:solidFill>
+            </a:ln>
+          </p:spPr>
+          <p:style>
+            <a:lnRef idx="2">
+              <a:schemeClr val="accent1">
+                <a:shade val="50000"/>
+              </a:schemeClr>
+            </a:lnRef>
+            <a:fillRef idx="1">
+              <a:schemeClr val="accent1"/>
+            </a:fillRef>
+            <a:effectRef idx="0">
+              <a:schemeClr val="accent1"/>
+            </a:effectRef>
+            <a:fontRef idx="minor">
+              <a:schemeClr val="lt1"/>
+            </a:fontRef>
+          </p:style>
+          <p:txBody>
+            <a:bodyPr rtlCol="0" anchor="ctr"/>
+            <a:lstStyle/>
+            <a:p>
+              <a:pPr algn="ctr"/>
+              <a:endParaRPr lang="tr-TR"/>
+            </a:p>
+          </p:txBody>
+        </p:sp>
+      </p:grpSp>
+      <p:sp>
+        <p:nvSpPr>
+          <p:cNvPr id="12" name="TextBox 11"/>
+          <p:cNvSpPr txBox="1"/>
+          <p:nvPr/>
+        </p:nvSpPr>
+        <p:spPr>
+          <a:xfrm>
+            <a:off x="4674565" y="4101697"/>
+            <a:ext cx="1768271" cy="646331"/>
+          </a:xfrm>
+          <a:prstGeom prst="rect">
+            <a:avLst/>
+          </a:prstGeom>
+          <a:noFill/>
+        </p:spPr>
+        <p:txBody>
+          <a:bodyPr wrap="square" rtlCol="0">
+            <a:spAutoFit/>
+          </a:bodyPr>
+          <a:lstStyle/>
+          <a:p>
+            <a:r>
+              <a:rPr lang="tr-TR" dirty="0" smtClean="0"/>
+              <a:t>It can filter 6Arms @ 1MHz</a:t>
+            </a:r>
+            <a:endParaRPr lang="tr-TR" dirty="0"/>
+          </a:p>
+        </p:txBody>
+      </p:sp>
+    </p:spTree>
+    <p:extLst>
+      <p:ext uri="{BB962C8B-B14F-4D97-AF65-F5344CB8AC3E}">
+        <p14:creationId xmlns:p14="http://schemas.microsoft.com/office/powerpoint/2010/main" val="942392589"/>
       </p:ext>
     </p:extLst>
   </p:cSld>

</xml_diff>

<commit_message>
Weekly report submission: capacitor selection is finalized and heatsink options are listed. They will be discussed tomorrow with @ozank
</commit_message>
<xml_diff>
--- a/Weekly Reports/2019.09.11 - 2019.09.18 Report.pptx
+++ b/Weekly Reports/2019.09.11 - 2019.09.18 Report.pptx
@@ -205,7 +205,7 @@
           <a:p>
             <a:fld id="{6967AB47-6931-48C6-B7ED-326D1228AFBA}" type="datetimeFigureOut">
               <a:rPr lang="tr-TR" smtClean="0"/>
-              <a:t>19.09.2019</a:t>
+              <a:t>24.09.2019</a:t>
             </a:fld>
             <a:endParaRPr lang="tr-TR"/>
           </a:p>
@@ -604,7 +604,7 @@
           <a:p>
             <a:fld id="{BD3B3769-65FE-41EA-85B6-D9F2AF76CBA9}" type="datetime1">
               <a:rPr lang="tr-TR" smtClean="0"/>
-              <a:t>19.09.2019</a:t>
+              <a:t>24.09.2019</a:t>
             </a:fld>
             <a:endParaRPr lang="tr-TR"/>
           </a:p>
@@ -774,7 +774,7 @@
           <a:p>
             <a:fld id="{2962A6A9-D976-4BDA-B10C-66B2B9DE9B4C}" type="datetime1">
               <a:rPr lang="tr-TR" smtClean="0"/>
-              <a:t>19.09.2019</a:t>
+              <a:t>24.09.2019</a:t>
             </a:fld>
             <a:endParaRPr lang="tr-TR"/>
           </a:p>
@@ -954,7 +954,7 @@
           <a:p>
             <a:fld id="{5600552A-E4D4-4B40-9929-1D3FB71F71FF}" type="datetime1">
               <a:rPr lang="tr-TR" smtClean="0"/>
-              <a:t>19.09.2019</a:t>
+              <a:t>24.09.2019</a:t>
             </a:fld>
             <a:endParaRPr lang="tr-TR"/>
           </a:p>
@@ -1124,7 +1124,7 @@
           <a:p>
             <a:fld id="{F9A85ECC-3CE4-4AD0-8EC5-3A36763AA76F}" type="datetime1">
               <a:rPr lang="tr-TR" smtClean="0"/>
-              <a:t>19.09.2019</a:t>
+              <a:t>24.09.2019</a:t>
             </a:fld>
             <a:endParaRPr lang="tr-TR"/>
           </a:p>
@@ -1370,7 +1370,7 @@
           <a:p>
             <a:fld id="{39F6AA4B-9646-44CC-B325-B50A183D6636}" type="datetime1">
               <a:rPr lang="tr-TR" smtClean="0"/>
-              <a:t>19.09.2019</a:t>
+              <a:t>24.09.2019</a:t>
             </a:fld>
             <a:endParaRPr lang="tr-TR"/>
           </a:p>
@@ -1602,7 +1602,7 @@
           <a:p>
             <a:fld id="{FD69D89B-A78C-481C-B4BE-82E51E30BA9C}" type="datetime1">
               <a:rPr lang="tr-TR" smtClean="0"/>
-              <a:t>19.09.2019</a:t>
+              <a:t>24.09.2019</a:t>
             </a:fld>
             <a:endParaRPr lang="tr-TR"/>
           </a:p>
@@ -1969,7 +1969,7 @@
           <a:p>
             <a:fld id="{473BE270-57FE-4717-982D-F02DFB5BECD5}" type="datetime1">
               <a:rPr lang="tr-TR" smtClean="0"/>
-              <a:t>19.09.2019</a:t>
+              <a:t>24.09.2019</a:t>
             </a:fld>
             <a:endParaRPr lang="tr-TR"/>
           </a:p>
@@ -2087,7 +2087,7 @@
           <a:p>
             <a:fld id="{BFAEDD45-6991-4862-9E84-DDF92EF341CB}" type="datetime1">
               <a:rPr lang="tr-TR" smtClean="0"/>
-              <a:t>19.09.2019</a:t>
+              <a:t>24.09.2019</a:t>
             </a:fld>
             <a:endParaRPr lang="tr-TR"/>
           </a:p>
@@ -2182,7 +2182,7 @@
           <a:p>
             <a:fld id="{23EE56C6-14E9-4870-96BE-3550760A1300}" type="datetime1">
               <a:rPr lang="tr-TR" smtClean="0"/>
-              <a:t>19.09.2019</a:t>
+              <a:t>24.09.2019</a:t>
             </a:fld>
             <a:endParaRPr lang="tr-TR"/>
           </a:p>
@@ -2459,7 +2459,7 @@
           <a:p>
             <a:fld id="{5EB3015D-7E17-406D-9A1A-3B2ADCD0CF79}" type="datetime1">
               <a:rPr lang="tr-TR" smtClean="0"/>
-              <a:t>19.09.2019</a:t>
+              <a:t>24.09.2019</a:t>
             </a:fld>
             <a:endParaRPr lang="tr-TR"/>
           </a:p>
@@ -2712,7 +2712,7 @@
           <a:p>
             <a:fld id="{8E1B6673-63A0-461F-BFBD-58F4D74CC1A0}" type="datetime1">
               <a:rPr lang="tr-TR" smtClean="0"/>
-              <a:t>19.09.2019</a:t>
+              <a:t>24.09.2019</a:t>
             </a:fld>
             <a:endParaRPr lang="tr-TR"/>
           </a:p>
@@ -2925,7 +2925,7 @@
           <a:p>
             <a:fld id="{9E8EF2ED-7087-4201-9521-97BB02159B09}" type="datetime1">
               <a:rPr lang="tr-TR" smtClean="0"/>
-              <a:t>19.09.2019</a:t>
+              <a:t>24.09.2019</a:t>
             </a:fld>
             <a:endParaRPr lang="tr-TR"/>
           </a:p>

</xml_diff>